<commit_message>
Working on prototype ppt presentation for M/A-COM tomorrow (9/25). Need to get more feedback to guide development.
</commit_message>
<xml_diff>
--- a/Screenshots/v2.0 Prototype/MA-COM PA Compression Test Software.pptx
+++ b/Screenshots/v2.0 Prototype/MA-COM PA Compression Test Software.pptx
@@ -5,25 +5,18 @@
     <p:sldMasterId id="2147483744" r:id="rId1"/>
   </p:sldMasterIdLst>
   <p:notesMasterIdLst>
-    <p:notesMasterId r:id="rId15"/>
+    <p:notesMasterId r:id="rId8"/>
   </p:notesMasterIdLst>
   <p:handoutMasterIdLst>
-    <p:handoutMasterId r:id="rId16"/>
+    <p:handoutMasterId r:id="rId9"/>
   </p:handoutMasterIdLst>
   <p:sldIdLst>
     <p:sldId id="287" r:id="rId2"/>
     <p:sldId id="288" r:id="rId3"/>
-    <p:sldId id="299" r:id="rId4"/>
-    <p:sldId id="289" r:id="rId5"/>
-    <p:sldId id="292" r:id="rId6"/>
-    <p:sldId id="293" r:id="rId7"/>
-    <p:sldId id="294" r:id="rId8"/>
-    <p:sldId id="300" r:id="rId9"/>
-    <p:sldId id="296" r:id="rId10"/>
-    <p:sldId id="295" r:id="rId11"/>
-    <p:sldId id="297" r:id="rId12"/>
-    <p:sldId id="301" r:id="rId13"/>
-    <p:sldId id="302" r:id="rId14"/>
+    <p:sldId id="289" r:id="rId4"/>
+    <p:sldId id="290" r:id="rId5"/>
+    <p:sldId id="291" r:id="rId6"/>
+    <p:sldId id="292" r:id="rId7"/>
   </p:sldIdLst>
   <p:sldSz cx="9144000" cy="6858000" type="screen4x3"/>
   <p:notesSz cx="6858000" cy="9144000"/>
@@ -247,7 +240,7 @@
           <a:p>
             <a:fld id="{7E816F9E-EE75-4A89-AADE-5C6F90F9BEAF}" type="datetimeFigureOut">
               <a:rPr lang="en-US" smtClean="0"/>
-              <a:t>8/17/2015</a:t>
+              <a:t>9/24/2015</a:t>
             </a:fld>
             <a:endParaRPr lang="en-US"/>
           </a:p>
@@ -412,7 +405,7 @@
           <a:p>
             <a:fld id="{BCE7110D-8713-4818-A6C5-BA5073E6EF19}" type="datetimeFigureOut">
               <a:rPr lang="en-US" smtClean="0"/>
-              <a:t>8/17/2015</a:t>
+              <a:t>9/24/2015</a:t>
             </a:fld>
             <a:endParaRPr lang="en-US" dirty="0"/>
           </a:p>
@@ -1069,7 +1062,7 @@
           <a:p>
             <a:fld id="{9F49682A-7718-48ED-BACA-E2115A57D5E7}" type="datetime1">
               <a:rPr lang="de-DE" smtClean="0"/>
-              <a:t>17.08.2015</a:t>
+              <a:t>24.09.2015</a:t>
             </a:fld>
             <a:endParaRPr lang="en-US" dirty="0"/>
           </a:p>
@@ -1333,7 +1326,7 @@
           <a:p>
             <a:fld id="{9F49682A-7718-48ED-BACA-E2115A57D5E7}" type="datetime1">
               <a:rPr lang="de-DE" smtClean="0"/>
-              <a:t>17.08.2015</a:t>
+              <a:t>24.09.2015</a:t>
             </a:fld>
             <a:endParaRPr lang="en-US" dirty="0"/>
           </a:p>
@@ -1659,7 +1652,7 @@
           <a:p>
             <a:fld id="{9F49682A-7718-48ED-BACA-E2115A57D5E7}" type="datetime1">
               <a:rPr lang="de-DE" smtClean="0"/>
-              <a:t>17.08.2015</a:t>
+              <a:t>24.09.2015</a:t>
             </a:fld>
             <a:endParaRPr lang="en-US" dirty="0"/>
           </a:p>
@@ -1989,7 +1982,7 @@
           <a:p>
             <a:fld id="{9F49682A-7718-48ED-BACA-E2115A57D5E7}" type="datetime1">
               <a:rPr lang="de-DE" smtClean="0"/>
-              <a:t>17.08.2015</a:t>
+              <a:t>24.09.2015</a:t>
             </a:fld>
             <a:endParaRPr lang="en-US" dirty="0"/>
           </a:p>
@@ -2294,7 +2287,7 @@
           <a:p>
             <a:fld id="{9F49682A-7718-48ED-BACA-E2115A57D5E7}" type="datetime1">
               <a:rPr lang="de-DE" smtClean="0"/>
-              <a:t>17.08.2015</a:t>
+              <a:t>24.09.2015</a:t>
             </a:fld>
             <a:endParaRPr lang="en-US" dirty="0"/>
           </a:p>
@@ -2752,7 +2745,7 @@
           <a:p>
             <a:fld id="{7A09C068-E302-4084-BE48-39709D40BB2B}" type="datetime1">
               <a:rPr lang="de-DE" smtClean="0"/>
-              <a:t>17.08.2015</a:t>
+              <a:t>24.09.2015</a:t>
             </a:fld>
             <a:endParaRPr lang="en-US" dirty="0" smtClean="0"/>
           </a:p>
@@ -3938,7 +3931,7 @@
           <a:p>
             <a:fld id="{FB1601E7-E2BE-4CD1-8EDF-048B8A04B4E7}" type="datetime1">
               <a:rPr lang="de-DE" smtClean="0"/>
-              <a:t>17.08.2015</a:t>
+              <a:t>24.09.2015</a:t>
             </a:fld>
             <a:endParaRPr lang="en-US" dirty="0" smtClean="0"/>
           </a:p>
@@ -4126,7 +4119,7 @@
           <a:p>
             <a:fld id="{88F73B3B-BF83-4993-8AD1-08C9EA27FB6B}" type="datetime1">
               <a:rPr lang="de-DE" smtClean="0"/>
-              <a:t>17.08.2015</a:t>
+              <a:t>24.09.2015</a:t>
             </a:fld>
             <a:endParaRPr lang="en-US" dirty="0" smtClean="0"/>
           </a:p>
@@ -4292,7 +4285,7 @@
           <a:p>
             <a:fld id="{346C3B9F-B113-479C-BFF8-AB0A13549411}" type="datetime1">
               <a:rPr lang="de-DE" smtClean="0"/>
-              <a:t>17.08.2015</a:t>
+              <a:t>24.09.2015</a:t>
             </a:fld>
             <a:endParaRPr lang="en-US" dirty="0" smtClean="0"/>
           </a:p>
@@ -4582,7 +4575,7 @@
           <a:p>
             <a:fld id="{66182CEC-485A-4DFF-AC5C-6D6F591D7CAC}" type="datetime1">
               <a:rPr lang="de-DE" smtClean="0"/>
-              <a:t>17.08.2015</a:t>
+              <a:t>24.09.2015</a:t>
             </a:fld>
             <a:endParaRPr lang="en-US" dirty="0" smtClean="0"/>
           </a:p>
@@ -4833,7 +4826,7 @@
           <a:p>
             <a:fld id="{5AE8DD92-C5D7-4CEF-9A80-65DAD0199F78}" type="datetime1">
               <a:rPr lang="de-DE" smtClean="0"/>
-              <a:t>17.08.2015</a:t>
+              <a:t>24.09.2015</a:t>
             </a:fld>
             <a:endParaRPr lang="en-US" dirty="0" smtClean="0"/>
           </a:p>
@@ -5053,7 +5046,7 @@
           <a:p>
             <a:fld id="{7F89930C-5ED3-47E6-B65A-F56F32CC05DA}" type="datetime1">
               <a:rPr lang="de-DE" smtClean="0"/>
-              <a:t>17.08.2015</a:t>
+              <a:t>24.09.2015</a:t>
             </a:fld>
             <a:endParaRPr lang="en-US" dirty="0" smtClean="0"/>
           </a:p>
@@ -5152,7 +5145,7 @@
           <a:p>
             <a:fld id="{733E53AE-ECB5-452A-A152-A339EAC6BEAA}" type="datetime1">
               <a:rPr lang="de-DE" smtClean="0"/>
-              <a:t>17.08.2015</a:t>
+              <a:t>24.09.2015</a:t>
             </a:fld>
             <a:endParaRPr lang="en-US" dirty="0" smtClean="0"/>
           </a:p>
@@ -5346,7 +5339,7 @@
           <a:p>
             <a:fld id="{F462ED18-71C3-4E61-9647-69438B1A8D14}" type="datetime1">
               <a:rPr lang="de-DE" smtClean="0"/>
-              <a:t>17.08.2015</a:t>
+              <a:t>24.09.2015</a:t>
             </a:fld>
             <a:endParaRPr lang="en-US" dirty="0" smtClean="0"/>
           </a:p>
@@ -5659,7 +5652,7 @@
           <a:p>
             <a:fld id="{9F49682A-7718-48ED-BACA-E2115A57D5E7}" type="datetime1">
               <a:rPr lang="de-DE" smtClean="0"/>
-              <a:t>17.08.2015</a:t>
+              <a:t>24.09.2015</a:t>
             </a:fld>
             <a:endParaRPr lang="en-US" dirty="0"/>
           </a:p>
@@ -6113,7 +6106,7 @@
           <a:p>
             <a:r>
               <a:rPr lang="en-US" dirty="0" smtClean="0"/>
-              <a:t>August 17</a:t>
+              <a:t>September 25</a:t>
             </a:r>
             <a:r>
               <a:rPr lang="en-US" baseline="30000" dirty="0" smtClean="0"/>
@@ -6121,7 +6114,11 @@
             </a:r>
             <a:r>
               <a:rPr lang="en-US" dirty="0" smtClean="0"/>
-              <a:t>, 2015</a:t>
+              <a:t>, </a:t>
+            </a:r>
+            <a:r>
+              <a:rPr lang="en-US" dirty="0" smtClean="0"/>
+              <a:t>2015</a:t>
             </a:r>
             <a:endParaRPr lang="en-US" dirty="0"/>
           </a:p>
@@ -6151,11 +6148,7 @@
             </a:br>
             <a:r>
               <a:rPr lang="en-US" dirty="0" smtClean="0"/>
-              <a:t>Improvements for </a:t>
-            </a:r>
-            <a:r>
-              <a:rPr lang="en-US" dirty="0" smtClean="0"/>
-              <a:t>M/A-COM</a:t>
+              <a:t>Improvements for M/A-COM</a:t>
             </a:r>
             <a:endParaRPr lang="en-US" dirty="0"/>
           </a:p>
@@ -6165,899 +6158,6 @@
     <p:extLst>
       <p:ext uri="{BB962C8B-B14F-4D97-AF65-F5344CB8AC3E}">
         <p14:creationId xmlns:p14="http://schemas.microsoft.com/office/powerpoint/2010/main" val="1544705226"/>
-      </p:ext>
-    </p:extLst>
-  </p:cSld>
-  <p:clrMapOvr>
-    <a:masterClrMapping/>
-  </p:clrMapOvr>
-</p:sld>
-</file>
-
-<file path=ppt/slides/slide10.xml><?xml version="1.0" encoding="utf-8"?>
-<p:sld xmlns:a="http://schemas.openxmlformats.org/drawingml/2006/main" xmlns:r="http://schemas.openxmlformats.org/officeDocument/2006/relationships" xmlns:p="http://schemas.openxmlformats.org/presentationml/2006/main">
-  <p:cSld>
-    <p:spTree>
-      <p:nvGrpSpPr>
-        <p:cNvPr id="1" name=""/>
-        <p:cNvGrpSpPr/>
-        <p:nvPr/>
-      </p:nvGrpSpPr>
-      <p:grpSpPr>
-        <a:xfrm>
-          <a:off x="0" y="0"/>
-          <a:ext cx="0" cy="0"/>
-          <a:chOff x="0" y="0"/>
-          <a:chExt cx="0" cy="0"/>
-        </a:xfrm>
-      </p:grpSpPr>
-      <p:sp>
-        <p:nvSpPr>
-          <p:cNvPr id="2" name="Title 1"/>
-          <p:cNvSpPr>
-            <a:spLocks noGrp="1"/>
-          </p:cNvSpPr>
-          <p:nvPr>
-            <p:ph type="title"/>
-          </p:nvPr>
-        </p:nvSpPr>
-        <p:spPr>
-          <a:xfrm>
-            <a:off x="360000" y="216000"/>
-            <a:ext cx="8280000" cy="721307"/>
-          </a:xfrm>
-        </p:spPr>
-        <p:txBody>
-          <a:bodyPr/>
-          <a:lstStyle/>
-          <a:p>
-            <a:r>
-              <a:rPr lang="en-US" dirty="0" smtClean="0"/>
-              <a:t>PA Compression Test</a:t>
-            </a:r>
-            <a:endParaRPr lang="en-US" dirty="0"/>
-          </a:p>
-        </p:txBody>
-      </p:sp>
-      <p:sp>
-        <p:nvSpPr>
-          <p:cNvPr id="3" name="Content Placeholder 2"/>
-          <p:cNvSpPr>
-            <a:spLocks noGrp="1"/>
-          </p:cNvSpPr>
-          <p:nvPr>
-            <p:ph idx="1"/>
-          </p:nvPr>
-        </p:nvSpPr>
-        <p:spPr>
-          <a:xfrm>
-            <a:off x="360000" y="937307"/>
-            <a:ext cx="8280000" cy="5110694"/>
-          </a:xfrm>
-        </p:spPr>
-        <p:txBody>
-          <a:bodyPr/>
-          <a:lstStyle/>
-          <a:p>
-            <a:r>
-              <a:rPr lang="en-US" dirty="0" smtClean="0"/>
-              <a:t>In progress:</a:t>
-            </a:r>
-          </a:p>
-          <a:p>
-            <a:pPr lvl="1"/>
-            <a:r>
-              <a:rPr lang="en-US" dirty="0" smtClean="0"/>
-              <a:t>Customize traces, axes in plots</a:t>
-            </a:r>
-          </a:p>
-          <a:p>
-            <a:pPr lvl="1"/>
-            <a:endParaRPr lang="en-US" dirty="0" smtClean="0"/>
-          </a:p>
-        </p:txBody>
-      </p:sp>
-      <p:sp>
-        <p:nvSpPr>
-          <p:cNvPr id="4" name="Date Placeholder 3"/>
-          <p:cNvSpPr>
-            <a:spLocks noGrp="1"/>
-          </p:cNvSpPr>
-          <p:nvPr>
-            <p:ph type="dt" sz="half" idx="10"/>
-          </p:nvPr>
-        </p:nvSpPr>
-        <p:spPr/>
-        <p:txBody>
-          <a:bodyPr/>
-          <a:lstStyle/>
-          <a:p>
-            <a:fld id="{FB1601E7-E2BE-4CD1-8EDF-048B8A04B4E7}" type="datetime1">
-              <a:rPr lang="de-DE" smtClean="0"/>
-              <a:t>17.08.2015</a:t>
-            </a:fld>
-            <a:endParaRPr lang="en-US" dirty="0" smtClean="0"/>
-          </a:p>
-        </p:txBody>
-      </p:sp>
-      <p:sp>
-        <p:nvSpPr>
-          <p:cNvPr id="5" name="Footer Placeholder 4"/>
-          <p:cNvSpPr>
-            <a:spLocks noGrp="1"/>
-          </p:cNvSpPr>
-          <p:nvPr>
-            <p:ph type="ftr" sz="quarter" idx="11"/>
-          </p:nvPr>
-        </p:nvSpPr>
-        <p:spPr/>
-        <p:txBody>
-          <a:bodyPr/>
-          <a:lstStyle/>
-          <a:p>
-            <a:r>
-              <a:rPr lang="en-US" smtClean="0"/>
-              <a:t>Footer: &gt;Insert &gt;Header &amp; Footer</a:t>
-            </a:r>
-            <a:endParaRPr lang="en-US" dirty="0" smtClean="0"/>
-          </a:p>
-        </p:txBody>
-      </p:sp>
-      <p:sp>
-        <p:nvSpPr>
-          <p:cNvPr id="6" name="Slide Number Placeholder 5"/>
-          <p:cNvSpPr>
-            <a:spLocks noGrp="1"/>
-          </p:cNvSpPr>
-          <p:nvPr>
-            <p:ph type="sldNum" sz="quarter" idx="12"/>
-          </p:nvPr>
-        </p:nvSpPr>
-        <p:spPr/>
-        <p:txBody>
-          <a:bodyPr/>
-          <a:lstStyle/>
-          <a:p>
-            <a:fld id="{57CB76AC-E5DF-427C-ABDC-2F4FBD8E4B69}" type="slidenum">
-              <a:rPr lang="en-US" smtClean="0"/>
-              <a:t>10</a:t>
-            </a:fld>
-            <a:endParaRPr lang="en-US" dirty="0"/>
-          </a:p>
-        </p:txBody>
-      </p:sp>
-      <p:pic>
-        <p:nvPicPr>
-          <p:cNvPr id="13" name="Picture 12"/>
-          <p:cNvPicPr>
-            <a:picLocks noChangeAspect="1"/>
-          </p:cNvPicPr>
-          <p:nvPr/>
-        </p:nvPicPr>
-        <p:blipFill>
-          <a:blip r:embed="rId2">
-            <a:extLst>
-              <a:ext uri="{28A0092B-C50C-407E-A947-70E740481C1C}">
-                <a14:useLocalDpi xmlns:a14="http://schemas.microsoft.com/office/drawing/2010/main" val="0"/>
-              </a:ext>
-            </a:extLst>
-          </a:blip>
-          <a:stretch>
-            <a:fillRect/>
-          </a:stretch>
-        </p:blipFill>
-        <p:spPr>
-          <a:xfrm>
-            <a:off x="1828800" y="2039112"/>
-            <a:ext cx="5486400" cy="3679424"/>
-          </a:xfrm>
-          <a:prstGeom prst="rect">
-            <a:avLst/>
-          </a:prstGeom>
-        </p:spPr>
-      </p:pic>
-    </p:spTree>
-    <p:extLst>
-      <p:ext uri="{BB962C8B-B14F-4D97-AF65-F5344CB8AC3E}">
-        <p14:creationId xmlns:p14="http://schemas.microsoft.com/office/powerpoint/2010/main" val="811601182"/>
-      </p:ext>
-    </p:extLst>
-  </p:cSld>
-  <p:clrMapOvr>
-    <a:masterClrMapping/>
-  </p:clrMapOvr>
-</p:sld>
-</file>
-
-<file path=ppt/slides/slide11.xml><?xml version="1.0" encoding="utf-8"?>
-<p:sld xmlns:a="http://schemas.openxmlformats.org/drawingml/2006/main" xmlns:r="http://schemas.openxmlformats.org/officeDocument/2006/relationships" xmlns:p="http://schemas.openxmlformats.org/presentationml/2006/main">
-  <p:cSld>
-    <p:spTree>
-      <p:nvGrpSpPr>
-        <p:cNvPr id="1" name=""/>
-        <p:cNvGrpSpPr/>
-        <p:nvPr/>
-      </p:nvGrpSpPr>
-      <p:grpSpPr>
-        <a:xfrm>
-          <a:off x="0" y="0"/>
-          <a:ext cx="0" cy="0"/>
-          <a:chOff x="0" y="0"/>
-          <a:chExt cx="0" cy="0"/>
-        </a:xfrm>
-      </p:grpSpPr>
-      <p:sp>
-        <p:nvSpPr>
-          <p:cNvPr id="2" name="Title 1"/>
-          <p:cNvSpPr>
-            <a:spLocks noGrp="1"/>
-          </p:cNvSpPr>
-          <p:nvPr>
-            <p:ph type="title"/>
-          </p:nvPr>
-        </p:nvSpPr>
-        <p:spPr>
-          <a:xfrm>
-            <a:off x="360000" y="216000"/>
-            <a:ext cx="8280000" cy="721307"/>
-          </a:xfrm>
-        </p:spPr>
-        <p:txBody>
-          <a:bodyPr/>
-          <a:lstStyle/>
-          <a:p>
-            <a:r>
-              <a:rPr lang="en-US" dirty="0" smtClean="0"/>
-              <a:t>PA Compression Test</a:t>
-            </a:r>
-            <a:endParaRPr lang="en-US" dirty="0"/>
-          </a:p>
-        </p:txBody>
-      </p:sp>
-      <p:sp>
-        <p:nvSpPr>
-          <p:cNvPr id="3" name="Content Placeholder 2"/>
-          <p:cNvSpPr>
-            <a:spLocks noGrp="1"/>
-          </p:cNvSpPr>
-          <p:nvPr>
-            <p:ph idx="1"/>
-          </p:nvPr>
-        </p:nvSpPr>
-        <p:spPr>
-          <a:xfrm>
-            <a:off x="360000" y="937307"/>
-            <a:ext cx="8280000" cy="5110694"/>
-          </a:xfrm>
-        </p:spPr>
-        <p:txBody>
-          <a:bodyPr/>
-          <a:lstStyle/>
-          <a:p>
-            <a:r>
-              <a:rPr lang="en-US" dirty="0" smtClean="0"/>
-              <a:t>In progress:</a:t>
-            </a:r>
-          </a:p>
-          <a:p>
-            <a:pPr lvl="1"/>
-            <a:r>
-              <a:rPr lang="en-US" dirty="0" smtClean="0"/>
-              <a:t>Customize traces, axes in plots</a:t>
-            </a:r>
-          </a:p>
-          <a:p>
-            <a:pPr lvl="1"/>
-            <a:r>
-              <a:rPr lang="en-US" b="1" dirty="0" smtClean="0"/>
-              <a:t>Add/Remove traces</a:t>
-            </a:r>
-          </a:p>
-          <a:p>
-            <a:pPr lvl="1"/>
-            <a:r>
-              <a:rPr lang="en-US" b="1" dirty="0" smtClean="0"/>
-              <a:t>Left/Right Y-Axis</a:t>
-            </a:r>
-          </a:p>
-          <a:p>
-            <a:pPr lvl="1"/>
-            <a:r>
-              <a:rPr lang="en-US" b="1" dirty="0" smtClean="0"/>
-              <a:t>Y Parameters:</a:t>
-            </a:r>
-          </a:p>
-          <a:p>
-            <a:pPr lvl="2"/>
-            <a:r>
-              <a:rPr lang="en-US" dirty="0" smtClean="0"/>
-              <a:t>Input Reflection, Gain, Reverse Gain, Output Reflection, Pin, Pout</a:t>
-            </a:r>
-          </a:p>
-          <a:p>
-            <a:pPr lvl="1"/>
-            <a:r>
-              <a:rPr lang="en-US" b="1" dirty="0" smtClean="0"/>
-              <a:t>Y Formats:</a:t>
-            </a:r>
-          </a:p>
-          <a:p>
-            <a:pPr lvl="2"/>
-            <a:r>
-              <a:rPr lang="en-US" dirty="0" smtClean="0"/>
-              <a:t>dB, mag, </a:t>
-            </a:r>
-            <a:r>
-              <a:rPr lang="en-US" dirty="0" err="1" smtClean="0"/>
-              <a:t>deg</a:t>
-            </a:r>
-            <a:r>
-              <a:rPr lang="en-US" dirty="0" smtClean="0"/>
-              <a:t>, rad, VSWR, </a:t>
-            </a:r>
-            <a:r>
-              <a:rPr lang="en-US" dirty="0" err="1" smtClean="0"/>
-              <a:t>dBm</a:t>
-            </a:r>
-            <a:endParaRPr lang="en-US" dirty="0" smtClean="0"/>
-          </a:p>
-          <a:p>
-            <a:pPr lvl="1"/>
-            <a:r>
-              <a:rPr lang="en-US" b="1" dirty="0" smtClean="0"/>
-              <a:t>X Parameter:</a:t>
-            </a:r>
-          </a:p>
-          <a:p>
-            <a:pPr lvl="2"/>
-            <a:r>
-              <a:rPr lang="en-US" dirty="0" smtClean="0"/>
-              <a:t>Frequency, Pin</a:t>
-            </a:r>
-          </a:p>
-          <a:p>
-            <a:pPr lvl="1"/>
-            <a:r>
-              <a:rPr lang="en-US" b="1" dirty="0" smtClean="0"/>
-              <a:t>At:</a:t>
-            </a:r>
-          </a:p>
-          <a:p>
-            <a:pPr lvl="2"/>
-            <a:r>
-              <a:rPr lang="en-US" dirty="0" smtClean="0"/>
-              <a:t>Fixed (custom) Pin value</a:t>
-            </a:r>
-          </a:p>
-          <a:p>
-            <a:pPr lvl="2"/>
-            <a:r>
-              <a:rPr lang="en-US" dirty="0" smtClean="0"/>
-              <a:t>Fixed (custom) Frequency</a:t>
-            </a:r>
-          </a:p>
-          <a:p>
-            <a:pPr lvl="2"/>
-            <a:r>
-              <a:rPr lang="en-US" dirty="0" smtClean="0"/>
-              <a:t>Compression</a:t>
-            </a:r>
-          </a:p>
-          <a:p>
-            <a:pPr lvl="2"/>
-            <a:r>
-              <a:rPr lang="en-US" dirty="0" smtClean="0"/>
-              <a:t>Maximum Gain</a:t>
-            </a:r>
-          </a:p>
-        </p:txBody>
-      </p:sp>
-      <p:sp>
-        <p:nvSpPr>
-          <p:cNvPr id="4" name="Date Placeholder 3"/>
-          <p:cNvSpPr>
-            <a:spLocks noGrp="1"/>
-          </p:cNvSpPr>
-          <p:nvPr>
-            <p:ph type="dt" sz="half" idx="10"/>
-          </p:nvPr>
-        </p:nvSpPr>
-        <p:spPr/>
-        <p:txBody>
-          <a:bodyPr/>
-          <a:lstStyle/>
-          <a:p>
-            <a:fld id="{FB1601E7-E2BE-4CD1-8EDF-048B8A04B4E7}" type="datetime1">
-              <a:rPr lang="de-DE" smtClean="0"/>
-              <a:t>17.08.2015</a:t>
-            </a:fld>
-            <a:endParaRPr lang="en-US" dirty="0" smtClean="0"/>
-          </a:p>
-        </p:txBody>
-      </p:sp>
-      <p:sp>
-        <p:nvSpPr>
-          <p:cNvPr id="5" name="Footer Placeholder 4"/>
-          <p:cNvSpPr>
-            <a:spLocks noGrp="1"/>
-          </p:cNvSpPr>
-          <p:nvPr>
-            <p:ph type="ftr" sz="quarter" idx="11"/>
-          </p:nvPr>
-        </p:nvSpPr>
-        <p:spPr/>
-        <p:txBody>
-          <a:bodyPr/>
-          <a:lstStyle/>
-          <a:p>
-            <a:r>
-              <a:rPr lang="en-US" smtClean="0"/>
-              <a:t>Footer: &gt;Insert &gt;Header &amp; Footer</a:t>
-            </a:r>
-            <a:endParaRPr lang="en-US" dirty="0" smtClean="0"/>
-          </a:p>
-        </p:txBody>
-      </p:sp>
-      <p:sp>
-        <p:nvSpPr>
-          <p:cNvPr id="6" name="Slide Number Placeholder 5"/>
-          <p:cNvSpPr>
-            <a:spLocks noGrp="1"/>
-          </p:cNvSpPr>
-          <p:nvPr>
-            <p:ph type="sldNum" sz="quarter" idx="12"/>
-          </p:nvPr>
-        </p:nvSpPr>
-        <p:spPr/>
-        <p:txBody>
-          <a:bodyPr/>
-          <a:lstStyle/>
-          <a:p>
-            <a:fld id="{57CB76AC-E5DF-427C-ABDC-2F4FBD8E4B69}" type="slidenum">
-              <a:rPr lang="en-US" smtClean="0"/>
-              <a:t>11</a:t>
-            </a:fld>
-            <a:endParaRPr lang="en-US" dirty="0"/>
-          </a:p>
-        </p:txBody>
-      </p:sp>
-      <p:pic>
-        <p:nvPicPr>
-          <p:cNvPr id="7" name="Picture 6"/>
-          <p:cNvPicPr>
-            <a:picLocks noChangeAspect="1"/>
-          </p:cNvPicPr>
-          <p:nvPr/>
-        </p:nvPicPr>
-        <p:blipFill>
-          <a:blip r:embed="rId2"/>
-          <a:stretch>
-            <a:fillRect/>
-          </a:stretch>
-        </p:blipFill>
-        <p:spPr>
-          <a:xfrm>
-            <a:off x="3200400" y="5095501"/>
-            <a:ext cx="5800725" cy="952500"/>
-          </a:xfrm>
-          <a:prstGeom prst="rect">
-            <a:avLst/>
-          </a:prstGeom>
-        </p:spPr>
-      </p:pic>
-    </p:spTree>
-    <p:extLst>
-      <p:ext uri="{BB962C8B-B14F-4D97-AF65-F5344CB8AC3E}">
-        <p14:creationId xmlns:p14="http://schemas.microsoft.com/office/powerpoint/2010/main" val="301740138"/>
-      </p:ext>
-    </p:extLst>
-  </p:cSld>
-  <p:clrMapOvr>
-    <a:masterClrMapping/>
-  </p:clrMapOvr>
-</p:sld>
-</file>
-
-<file path=ppt/slides/slide12.xml><?xml version="1.0" encoding="utf-8"?>
-<p:sld xmlns:a="http://schemas.openxmlformats.org/drawingml/2006/main" xmlns:r="http://schemas.openxmlformats.org/officeDocument/2006/relationships" xmlns:p="http://schemas.openxmlformats.org/presentationml/2006/main">
-  <p:cSld>
-    <p:spTree>
-      <p:nvGrpSpPr>
-        <p:cNvPr id="1" name=""/>
-        <p:cNvGrpSpPr/>
-        <p:nvPr/>
-      </p:nvGrpSpPr>
-      <p:grpSpPr>
-        <a:xfrm>
-          <a:off x="0" y="0"/>
-          <a:ext cx="0" cy="0"/>
-          <a:chOff x="0" y="0"/>
-          <a:chExt cx="0" cy="0"/>
-        </a:xfrm>
-      </p:grpSpPr>
-      <p:sp>
-        <p:nvSpPr>
-          <p:cNvPr id="2" name="Title 1"/>
-          <p:cNvSpPr>
-            <a:spLocks noGrp="1"/>
-          </p:cNvSpPr>
-          <p:nvPr>
-            <p:ph type="title"/>
-          </p:nvPr>
-        </p:nvSpPr>
-        <p:spPr>
-          <a:xfrm>
-            <a:off x="360000" y="216000"/>
-            <a:ext cx="8280000" cy="721307"/>
-          </a:xfrm>
-        </p:spPr>
-        <p:txBody>
-          <a:bodyPr/>
-          <a:lstStyle/>
-          <a:p>
-            <a:r>
-              <a:rPr lang="en-US" dirty="0" smtClean="0"/>
-              <a:t>PA Compression Test</a:t>
-            </a:r>
-            <a:endParaRPr lang="en-US" dirty="0"/>
-          </a:p>
-        </p:txBody>
-      </p:sp>
-      <p:sp>
-        <p:nvSpPr>
-          <p:cNvPr id="3" name="Content Placeholder 2"/>
-          <p:cNvSpPr>
-            <a:spLocks noGrp="1"/>
-          </p:cNvSpPr>
-          <p:nvPr>
-            <p:ph idx="1"/>
-          </p:nvPr>
-        </p:nvSpPr>
-        <p:spPr>
-          <a:xfrm>
-            <a:off x="360000" y="937307"/>
-            <a:ext cx="8280000" cy="5110694"/>
-          </a:xfrm>
-        </p:spPr>
-        <p:txBody>
-          <a:bodyPr/>
-          <a:lstStyle/>
-          <a:p>
-            <a:r>
-              <a:rPr lang="en-US" dirty="0" smtClean="0"/>
-              <a:t>In progress:</a:t>
-            </a:r>
-          </a:p>
-          <a:p>
-            <a:r>
-              <a:rPr lang="en-US" dirty="0" smtClean="0"/>
-              <a:t>Continuous compression data update</a:t>
-            </a:r>
-          </a:p>
-          <a:p>
-            <a:pPr lvl="1"/>
-            <a:r>
-              <a:rPr lang="en-US" dirty="0" smtClean="0"/>
-              <a:t>Display results as sweeps are completed</a:t>
-            </a:r>
-          </a:p>
-          <a:p>
-            <a:r>
-              <a:rPr lang="en-US" dirty="0" smtClean="0"/>
-              <a:t>Stop at compression point (overdrive protection)</a:t>
-            </a:r>
-            <a:endParaRPr lang="en-US" dirty="0"/>
-          </a:p>
-          <a:p>
-            <a:pPr lvl="1"/>
-            <a:r>
-              <a:rPr lang="en-US" dirty="0" smtClean="0"/>
-              <a:t>If compression is reached before Stop Power, stop the sweep</a:t>
-            </a:r>
-          </a:p>
-          <a:p>
-            <a:pPr lvl="1"/>
-            <a:r>
-              <a:rPr lang="en-US" dirty="0" smtClean="0"/>
-              <a:t>Still researching best (fastest) way to implement this</a:t>
-            </a:r>
-          </a:p>
-          <a:p>
-            <a:r>
-              <a:rPr lang="en-US" dirty="0" smtClean="0"/>
-              <a:t>Accommodate pulsed RF measurements</a:t>
-            </a:r>
-          </a:p>
-          <a:p>
-            <a:pPr lvl="1"/>
-            <a:r>
-              <a:rPr lang="en-US" dirty="0" smtClean="0"/>
-              <a:t>User configures VNA for pulsed RF measurement</a:t>
-            </a:r>
-          </a:p>
-          <a:p>
-            <a:pPr lvl="1"/>
-            <a:r>
-              <a:rPr lang="en-US" dirty="0" smtClean="0"/>
-              <a:t>Application detects pulsed RF conditions</a:t>
-            </a:r>
-          </a:p>
-          <a:p>
-            <a:pPr lvl="1"/>
-            <a:r>
-              <a:rPr lang="en-US" dirty="0" smtClean="0"/>
-              <a:t>Measurement sweeps use current triggers, timing</a:t>
-            </a:r>
-          </a:p>
-        </p:txBody>
-      </p:sp>
-      <p:sp>
-        <p:nvSpPr>
-          <p:cNvPr id="4" name="Date Placeholder 3"/>
-          <p:cNvSpPr>
-            <a:spLocks noGrp="1"/>
-          </p:cNvSpPr>
-          <p:nvPr>
-            <p:ph type="dt" sz="half" idx="10"/>
-          </p:nvPr>
-        </p:nvSpPr>
-        <p:spPr/>
-        <p:txBody>
-          <a:bodyPr/>
-          <a:lstStyle/>
-          <a:p>
-            <a:fld id="{FB1601E7-E2BE-4CD1-8EDF-048B8A04B4E7}" type="datetime1">
-              <a:rPr lang="de-DE" smtClean="0"/>
-              <a:t>17.08.2015</a:t>
-            </a:fld>
-            <a:endParaRPr lang="en-US" dirty="0" smtClean="0"/>
-          </a:p>
-        </p:txBody>
-      </p:sp>
-      <p:sp>
-        <p:nvSpPr>
-          <p:cNvPr id="5" name="Footer Placeholder 4"/>
-          <p:cNvSpPr>
-            <a:spLocks noGrp="1"/>
-          </p:cNvSpPr>
-          <p:nvPr>
-            <p:ph type="ftr" sz="quarter" idx="11"/>
-          </p:nvPr>
-        </p:nvSpPr>
-        <p:spPr/>
-        <p:txBody>
-          <a:bodyPr/>
-          <a:lstStyle/>
-          <a:p>
-            <a:r>
-              <a:rPr lang="en-US" smtClean="0"/>
-              <a:t>Footer: &gt;Insert &gt;Header &amp; Footer</a:t>
-            </a:r>
-            <a:endParaRPr lang="en-US" dirty="0" smtClean="0"/>
-          </a:p>
-        </p:txBody>
-      </p:sp>
-      <p:sp>
-        <p:nvSpPr>
-          <p:cNvPr id="6" name="Slide Number Placeholder 5"/>
-          <p:cNvSpPr>
-            <a:spLocks noGrp="1"/>
-          </p:cNvSpPr>
-          <p:nvPr>
-            <p:ph type="sldNum" sz="quarter" idx="12"/>
-          </p:nvPr>
-        </p:nvSpPr>
-        <p:spPr/>
-        <p:txBody>
-          <a:bodyPr/>
-          <a:lstStyle/>
-          <a:p>
-            <a:fld id="{57CB76AC-E5DF-427C-ABDC-2F4FBD8E4B69}" type="slidenum">
-              <a:rPr lang="en-US" smtClean="0"/>
-              <a:t>12</a:t>
-            </a:fld>
-            <a:endParaRPr lang="en-US" dirty="0"/>
-          </a:p>
-        </p:txBody>
-      </p:sp>
-    </p:spTree>
-    <p:extLst>
-      <p:ext uri="{BB962C8B-B14F-4D97-AF65-F5344CB8AC3E}">
-        <p14:creationId xmlns:p14="http://schemas.microsoft.com/office/powerpoint/2010/main" val="2406865982"/>
-      </p:ext>
-    </p:extLst>
-  </p:cSld>
-  <p:clrMapOvr>
-    <a:masterClrMapping/>
-  </p:clrMapOvr>
-</p:sld>
-</file>
-
-<file path=ppt/slides/slide13.xml><?xml version="1.0" encoding="utf-8"?>
-<p:sld xmlns:a="http://schemas.openxmlformats.org/drawingml/2006/main" xmlns:r="http://schemas.openxmlformats.org/officeDocument/2006/relationships" xmlns:p="http://schemas.openxmlformats.org/presentationml/2006/main">
-  <p:cSld>
-    <p:spTree>
-      <p:nvGrpSpPr>
-        <p:cNvPr id="1" name=""/>
-        <p:cNvGrpSpPr/>
-        <p:nvPr/>
-      </p:nvGrpSpPr>
-      <p:grpSpPr>
-        <a:xfrm>
-          <a:off x="0" y="0"/>
-          <a:ext cx="0" cy="0"/>
-          <a:chOff x="0" y="0"/>
-          <a:chExt cx="0" cy="0"/>
-        </a:xfrm>
-      </p:grpSpPr>
-      <p:sp>
-        <p:nvSpPr>
-          <p:cNvPr id="2" name="Title 1"/>
-          <p:cNvSpPr>
-            <a:spLocks noGrp="1"/>
-          </p:cNvSpPr>
-          <p:nvPr>
-            <p:ph type="title"/>
-          </p:nvPr>
-        </p:nvSpPr>
-        <p:spPr>
-          <a:xfrm>
-            <a:off x="360000" y="216000"/>
-            <a:ext cx="8280000" cy="721307"/>
-          </a:xfrm>
-        </p:spPr>
-        <p:txBody>
-          <a:bodyPr/>
-          <a:lstStyle/>
-          <a:p>
-            <a:r>
-              <a:rPr lang="en-US" dirty="0" smtClean="0"/>
-              <a:t>PA Compression Test</a:t>
-            </a:r>
-            <a:endParaRPr lang="en-US" dirty="0"/>
-          </a:p>
-        </p:txBody>
-      </p:sp>
-      <p:sp>
-        <p:nvSpPr>
-          <p:cNvPr id="3" name="Content Placeholder 2"/>
-          <p:cNvSpPr>
-            <a:spLocks noGrp="1"/>
-          </p:cNvSpPr>
-          <p:nvPr>
-            <p:ph idx="1"/>
-          </p:nvPr>
-        </p:nvSpPr>
-        <p:spPr>
-          <a:xfrm>
-            <a:off x="360000" y="937307"/>
-            <a:ext cx="8280000" cy="5110694"/>
-          </a:xfrm>
-        </p:spPr>
-        <p:txBody>
-          <a:bodyPr/>
-          <a:lstStyle/>
-          <a:p>
-            <a:r>
-              <a:rPr lang="en-US" dirty="0" smtClean="0"/>
-              <a:t>Timeline:</a:t>
-            </a:r>
-          </a:p>
-          <a:p>
-            <a:pPr lvl="1"/>
-            <a:r>
-              <a:rPr lang="en-US" dirty="0" smtClean="0"/>
-              <a:t>Free select plots       – This week (8/21)</a:t>
-            </a:r>
-          </a:p>
-          <a:p>
-            <a:pPr lvl="1"/>
-            <a:r>
-              <a:rPr lang="en-US" dirty="0" smtClean="0"/>
-              <a:t>Gain expansion         – This week (8/21)</a:t>
-            </a:r>
-          </a:p>
-          <a:p>
-            <a:pPr lvl="1"/>
-            <a:r>
-              <a:rPr lang="en-US" dirty="0" smtClean="0"/>
-              <a:t>Continuously update results    – Next week (8/28)</a:t>
-            </a:r>
-          </a:p>
-          <a:p>
-            <a:pPr lvl="1"/>
-            <a:r>
-              <a:rPr lang="en-US" dirty="0" smtClean="0"/>
-              <a:t>Overdrive protection – One month</a:t>
-            </a:r>
-          </a:p>
-          <a:p>
-            <a:pPr lvl="1"/>
-            <a:r>
-              <a:rPr lang="en-US" dirty="0" smtClean="0"/>
-              <a:t>Pulsed RF                 –  1-2 months</a:t>
-            </a:r>
-            <a:endParaRPr lang="en-US" dirty="0"/>
-          </a:p>
-          <a:p>
-            <a:pPr lvl="1"/>
-            <a:endParaRPr lang="en-US" dirty="0" smtClean="0"/>
-          </a:p>
-        </p:txBody>
-      </p:sp>
-      <p:sp>
-        <p:nvSpPr>
-          <p:cNvPr id="4" name="Date Placeholder 3"/>
-          <p:cNvSpPr>
-            <a:spLocks noGrp="1"/>
-          </p:cNvSpPr>
-          <p:nvPr>
-            <p:ph type="dt" sz="half" idx="10"/>
-          </p:nvPr>
-        </p:nvSpPr>
-        <p:spPr/>
-        <p:txBody>
-          <a:bodyPr/>
-          <a:lstStyle/>
-          <a:p>
-            <a:fld id="{FB1601E7-E2BE-4CD1-8EDF-048B8A04B4E7}" type="datetime1">
-              <a:rPr lang="de-DE" smtClean="0"/>
-              <a:t>17.08.2015</a:t>
-            </a:fld>
-            <a:endParaRPr lang="en-US" dirty="0" smtClean="0"/>
-          </a:p>
-        </p:txBody>
-      </p:sp>
-      <p:sp>
-        <p:nvSpPr>
-          <p:cNvPr id="5" name="Footer Placeholder 4"/>
-          <p:cNvSpPr>
-            <a:spLocks noGrp="1"/>
-          </p:cNvSpPr>
-          <p:nvPr>
-            <p:ph type="ftr" sz="quarter" idx="11"/>
-          </p:nvPr>
-        </p:nvSpPr>
-        <p:spPr/>
-        <p:txBody>
-          <a:bodyPr/>
-          <a:lstStyle/>
-          <a:p>
-            <a:r>
-              <a:rPr lang="en-US" smtClean="0"/>
-              <a:t>Footer: &gt;Insert &gt;Header &amp; Footer</a:t>
-            </a:r>
-            <a:endParaRPr lang="en-US" dirty="0" smtClean="0"/>
-          </a:p>
-        </p:txBody>
-      </p:sp>
-      <p:sp>
-        <p:nvSpPr>
-          <p:cNvPr id="6" name="Slide Number Placeholder 5"/>
-          <p:cNvSpPr>
-            <a:spLocks noGrp="1"/>
-          </p:cNvSpPr>
-          <p:nvPr>
-            <p:ph type="sldNum" sz="quarter" idx="12"/>
-          </p:nvPr>
-        </p:nvSpPr>
-        <p:spPr/>
-        <p:txBody>
-          <a:bodyPr/>
-          <a:lstStyle/>
-          <a:p>
-            <a:fld id="{57CB76AC-E5DF-427C-ABDC-2F4FBD8E4B69}" type="slidenum">
-              <a:rPr lang="en-US" smtClean="0"/>
-              <a:t>13</a:t>
-            </a:fld>
-            <a:endParaRPr lang="en-US" dirty="0"/>
-          </a:p>
-        </p:txBody>
-      </p:sp>
-    </p:spTree>
-    <p:extLst>
-      <p:ext uri="{BB962C8B-B14F-4D97-AF65-F5344CB8AC3E}">
-        <p14:creationId xmlns:p14="http://schemas.microsoft.com/office/powerpoint/2010/main" val="281421016"/>
       </p:ext>
     </p:extLst>
   </p:cSld>
@@ -7124,42 +6224,28 @@
           <a:p>
             <a:r>
               <a:rPr lang="en-US" dirty="0" smtClean="0"/>
-              <a:t>M/A-COM Requested improvements:</a:t>
+              <a:t>Three logical parts:</a:t>
             </a:r>
           </a:p>
           <a:p>
             <a:pPr lvl="1"/>
             <a:r>
               <a:rPr lang="en-US" dirty="0" smtClean="0"/>
-              <a:t>Plot Phase vs Pin, Pout</a:t>
+              <a:t>Measurement (Power vs Frequency sweeps)</a:t>
             </a:r>
           </a:p>
           <a:p>
             <a:pPr lvl="1"/>
             <a:r>
               <a:rPr lang="en-US" dirty="0" smtClean="0"/>
-              <a:t>Reference compression to gain expansion (max. gain)</a:t>
+              <a:t>Plot generation</a:t>
             </a:r>
           </a:p>
           <a:p>
             <a:pPr lvl="1"/>
             <a:r>
               <a:rPr lang="en-US" dirty="0" smtClean="0"/>
-              <a:t>Continuously update results during measurement</a:t>
-            </a:r>
-          </a:p>
-          <a:p>
-            <a:pPr lvl="1"/>
-            <a:r>
-              <a:rPr lang="en-US" dirty="0" smtClean="0"/>
-              <a:t>Stop power at compression (overdrive protection)</a:t>
-            </a:r>
-          </a:p>
-          <a:p>
-            <a:pPr lvl="1"/>
-            <a:r>
-              <a:rPr lang="en-US" dirty="0" smtClean="0"/>
-              <a:t>Accommodate pulsed power</a:t>
+              <a:t>Data to Memory (Hold)</a:t>
             </a:r>
             <a:endParaRPr lang="en-US" dirty="0"/>
           </a:p>
@@ -7182,7 +6268,7 @@
           <a:p>
             <a:fld id="{FB1601E7-E2BE-4CD1-8EDF-048B8A04B4E7}" type="datetime1">
               <a:rPr lang="de-DE" smtClean="0"/>
-              <a:t>17.08.2015</a:t>
+              <a:t>24.09.2015</a:t>
             </a:fld>
             <a:endParaRPr lang="en-US" dirty="0" smtClean="0"/>
           </a:p>
@@ -7266,7 +6352,104 @@
       </p:grpSpPr>
       <p:sp>
         <p:nvSpPr>
-          <p:cNvPr id="2" name="Date Placeholder 1"/>
+          <p:cNvPr id="2" name="Title 1"/>
+          <p:cNvSpPr>
+            <a:spLocks noGrp="1"/>
+          </p:cNvSpPr>
+          <p:nvPr>
+            <p:ph type="title"/>
+          </p:nvPr>
+        </p:nvSpPr>
+        <p:spPr>
+          <a:xfrm>
+            <a:off x="360000" y="216000"/>
+            <a:ext cx="8280000" cy="721307"/>
+          </a:xfrm>
+        </p:spPr>
+        <p:txBody>
+          <a:bodyPr/>
+          <a:lstStyle/>
+          <a:p>
+            <a:r>
+              <a:rPr lang="en-US" dirty="0" smtClean="0"/>
+              <a:t>PA Compression Test</a:t>
+            </a:r>
+            <a:endParaRPr lang="en-US" dirty="0"/>
+          </a:p>
+        </p:txBody>
+      </p:sp>
+      <p:sp>
+        <p:nvSpPr>
+          <p:cNvPr id="3" name="Content Placeholder 2"/>
+          <p:cNvSpPr>
+            <a:spLocks noGrp="1"/>
+          </p:cNvSpPr>
+          <p:nvPr>
+            <p:ph idx="1"/>
+          </p:nvPr>
+        </p:nvSpPr>
+        <p:spPr>
+          <a:xfrm>
+            <a:off x="360000" y="937307"/>
+            <a:ext cx="8280000" cy="5110694"/>
+          </a:xfrm>
+        </p:spPr>
+        <p:txBody>
+          <a:bodyPr/>
+          <a:lstStyle/>
+          <a:p>
+            <a:pPr marL="342900" indent="-342900">
+              <a:buFont typeface="+mj-lt"/>
+              <a:buAutoNum type="arabicPeriod"/>
+            </a:pPr>
+            <a:r>
+              <a:rPr lang="en-US" dirty="0" smtClean="0"/>
+              <a:t>Measurement</a:t>
+            </a:r>
+          </a:p>
+          <a:p>
+            <a:pPr lvl="1"/>
+            <a:r>
+              <a:rPr lang="en-US" dirty="0" smtClean="0"/>
+              <a:t>Sweep power vs frequency</a:t>
+            </a:r>
+          </a:p>
+          <a:p>
+            <a:pPr lvl="1"/>
+            <a:r>
+              <a:rPr lang="en-US" dirty="0" smtClean="0"/>
+              <a:t>Stop at compression</a:t>
+            </a:r>
+          </a:p>
+          <a:p>
+            <a:pPr lvl="1"/>
+            <a:r>
+              <a:rPr lang="en-US" dirty="0"/>
+              <a:t>Accommodate gain </a:t>
+            </a:r>
+            <a:r>
+              <a:rPr lang="en-US" dirty="0" smtClean="0"/>
+              <a:t>expansion</a:t>
+            </a:r>
+            <a:endParaRPr lang="en-US" dirty="0" smtClean="0"/>
+          </a:p>
+          <a:p>
+            <a:pPr lvl="1"/>
+            <a:r>
+              <a:rPr lang="en-US" dirty="0" smtClean="0"/>
+              <a:t>Accommodate pulsed power conditions</a:t>
+            </a:r>
+            <a:endParaRPr lang="en-US" dirty="0" smtClean="0"/>
+          </a:p>
+          <a:p>
+            <a:pPr lvl="1"/>
+            <a:endParaRPr lang="en-US" dirty="0"/>
+          </a:p>
+        </p:txBody>
+      </p:sp>
+      <p:sp>
+        <p:nvSpPr>
+          <p:cNvPr id="4" name="Date Placeholder 3"/>
           <p:cNvSpPr>
             <a:spLocks noGrp="1"/>
           </p:cNvSpPr>
@@ -7279,9 +6462,9 @@
           <a:bodyPr/>
           <a:lstStyle/>
           <a:p>
-            <a:fld id="{346C3B9F-B113-479C-BFF8-AB0A13549411}" type="datetime1">
+            <a:fld id="{FB1601E7-E2BE-4CD1-8EDF-048B8A04B4E7}" type="datetime1">
               <a:rPr lang="de-DE" smtClean="0"/>
-              <a:t>17.08.2015</a:t>
+              <a:t>24.09.2015</a:t>
             </a:fld>
             <a:endParaRPr lang="en-US" dirty="0" smtClean="0"/>
           </a:p>
@@ -7289,7 +6472,7 @@
       </p:sp>
       <p:sp>
         <p:nvSpPr>
-          <p:cNvPr id="3" name="Footer Placeholder 2"/>
+          <p:cNvPr id="5" name="Footer Placeholder 4"/>
           <p:cNvSpPr>
             <a:spLocks noGrp="1"/>
           </p:cNvSpPr>
@@ -7312,7 +6495,7 @@
       </p:sp>
       <p:sp>
         <p:nvSpPr>
-          <p:cNvPr id="4" name="Slide Number Placeholder 3"/>
+          <p:cNvPr id="6" name="Slide Number Placeholder 5"/>
           <p:cNvSpPr>
             <a:spLocks noGrp="1"/>
           </p:cNvSpPr>
@@ -7333,40 +6516,40 @@
           </a:p>
         </p:txBody>
       </p:sp>
-      <p:sp>
-        <p:nvSpPr>
-          <p:cNvPr id="5" name="Title 4"/>
-          <p:cNvSpPr>
-            <a:spLocks noGrp="1"/>
-          </p:cNvSpPr>
-          <p:nvPr>
-            <p:ph type="title"/>
-          </p:nvPr>
-        </p:nvSpPr>
-        <p:spPr/>
-        <p:txBody>
-          <a:bodyPr/>
-          <a:lstStyle/>
-          <a:p>
-            <a:r>
-              <a:rPr lang="en-US" dirty="0" smtClean="0"/>
-              <a:t>PA Compression Test Software</a:t>
-            </a:r>
-            <a:br>
-              <a:rPr lang="en-US" dirty="0" smtClean="0"/>
-            </a:br>
-            <a:r>
-              <a:rPr lang="en-US" dirty="0" smtClean="0"/>
-              <a:t>Current capability</a:t>
-            </a:r>
-            <a:endParaRPr lang="en-US" dirty="0"/>
-          </a:p>
-        </p:txBody>
-      </p:sp>
+      <p:pic>
+        <p:nvPicPr>
+          <p:cNvPr id="9" name="Picture 8"/>
+          <p:cNvPicPr>
+            <a:picLocks noChangeAspect="1"/>
+          </p:cNvPicPr>
+          <p:nvPr/>
+        </p:nvPicPr>
+        <p:blipFill>
+          <a:blip r:embed="rId2">
+            <a:extLst>
+              <a:ext uri="{28A0092B-C50C-407E-A947-70E740481C1C}">
+                <a14:useLocalDpi xmlns:a14="http://schemas.microsoft.com/office/drawing/2010/main" val="0"/>
+              </a:ext>
+            </a:extLst>
+          </a:blip>
+          <a:stretch>
+            <a:fillRect/>
+          </a:stretch>
+        </p:blipFill>
+        <p:spPr>
+          <a:xfrm>
+            <a:off x="2514600" y="2667000"/>
+            <a:ext cx="4682100" cy="3140024"/>
+          </a:xfrm>
+          <a:prstGeom prst="rect">
+            <a:avLst/>
+          </a:prstGeom>
+        </p:spPr>
+      </p:pic>
     </p:spTree>
     <p:extLst>
       <p:ext uri="{BB962C8B-B14F-4D97-AF65-F5344CB8AC3E}">
-        <p14:creationId xmlns:p14="http://schemas.microsoft.com/office/powerpoint/2010/main" val="3631904484"/>
+        <p14:creationId xmlns:p14="http://schemas.microsoft.com/office/powerpoint/2010/main" val="1305932812"/>
       </p:ext>
     </p:extLst>
   </p:cSld>
@@ -7441,24 +6624,24 @@
           <a:bodyPr/>
           <a:lstStyle/>
           <a:p>
-            <a:r>
-              <a:rPr lang="en-US" dirty="0" smtClean="0"/>
-              <a:t>Current version of the software:</a:t>
+            <a:pPr marL="342900" indent="-342900">
+              <a:buFont typeface="+mj-lt"/>
+              <a:buAutoNum type="arabicPeriod" startAt="2"/>
+            </a:pPr>
+            <a:r>
+              <a:rPr lang="en-US" dirty="0" smtClean="0"/>
+              <a:t>Plot Generation</a:t>
             </a:r>
           </a:p>
           <a:p>
             <a:pPr lvl="1"/>
             <a:r>
               <a:rPr lang="en-US" dirty="0" smtClean="0"/>
-              <a:t>Run on/off instrument</a:t>
+              <a:t>Current results screen:</a:t>
             </a:r>
           </a:p>
           <a:p>
             <a:pPr lvl="1"/>
-            <a:r>
-              <a:rPr lang="en-US" dirty="0" smtClean="0"/>
-              <a:t>Connect via VISA (Ethernet, GPIB)</a:t>
-            </a:r>
             <a:endParaRPr lang="en-US" dirty="0"/>
           </a:p>
         </p:txBody>
@@ -7480,7 +6663,7 @@
           <a:p>
             <a:fld id="{FB1601E7-E2BE-4CD1-8EDF-048B8A04B4E7}" type="datetime1">
               <a:rPr lang="de-DE" smtClean="0"/>
-              <a:t>17.08.2015</a:t>
+              <a:t>24.09.2015</a:t>
             </a:fld>
             <a:endParaRPr lang="en-US" dirty="0" smtClean="0"/>
           </a:p>
@@ -7534,7 +6717,7 @@
       </p:sp>
       <p:pic>
         <p:nvPicPr>
-          <p:cNvPr id="8" name="Picture 7"/>
+          <p:cNvPr id="7" name="Picture 6"/>
           <p:cNvPicPr>
             <a:picLocks noChangeAspect="1"/>
           </p:cNvPicPr>
@@ -7554,8 +6737,8 @@
         </p:blipFill>
         <p:spPr>
           <a:xfrm>
-            <a:off x="1828800" y="2035577"/>
-            <a:ext cx="5486400" cy="3679423"/>
+            <a:off x="1905000" y="1905000"/>
+            <a:ext cx="5508670" cy="3733800"/>
           </a:xfrm>
           <a:prstGeom prst="rect">
             <a:avLst/>
@@ -7565,7 +6748,7 @@
     </p:spTree>
     <p:extLst>
       <p:ext uri="{BB962C8B-B14F-4D97-AF65-F5344CB8AC3E}">
-        <p14:creationId xmlns:p14="http://schemas.microsoft.com/office/powerpoint/2010/main" val="1305932812"/>
+        <p14:creationId xmlns:p14="http://schemas.microsoft.com/office/powerpoint/2010/main" val="743580071"/>
       </p:ext>
     </p:extLst>
   </p:cSld>
@@ -7640,18 +6823,112 @@
           <a:bodyPr/>
           <a:lstStyle/>
           <a:p>
-            <a:r>
-              <a:rPr lang="en-US" dirty="0" smtClean="0"/>
-              <a:t>Current version of the software:</a:t>
-            </a:r>
+            <a:pPr marL="342900" indent="-342900">
+              <a:buFont typeface="+mj-lt"/>
+              <a:buAutoNum type="arabicPeriod" startAt="2"/>
+            </a:pPr>
+            <a:r>
+              <a:rPr lang="en-US" dirty="0" smtClean="0"/>
+              <a:t>Plot Generation</a:t>
+            </a:r>
+          </a:p>
+          <a:p>
+            <a:pPr lvl="1"/>
+            <a:r>
+              <a:rPr lang="en-US" dirty="0" smtClean="0"/>
+              <a:t>Request: plots on VNA</a:t>
+            </a:r>
+          </a:p>
+          <a:p>
+            <a:pPr lvl="1"/>
+            <a:r>
+              <a:rPr lang="en-US" dirty="0" smtClean="0"/>
+              <a:t>Question: Are these trace settings sufficient?</a:t>
+            </a:r>
+          </a:p>
+          <a:p>
+            <a:pPr lvl="1"/>
             <a:endParaRPr lang="en-US" dirty="0"/>
           </a:p>
           <a:p>
             <a:pPr lvl="1"/>
-            <a:r>
-              <a:rPr lang="en-US" dirty="0" smtClean="0"/>
-              <a:t>Measurement settings</a:t>
-            </a:r>
+            <a:endParaRPr lang="en-US" dirty="0" smtClean="0"/>
+          </a:p>
+          <a:p>
+            <a:pPr lvl="1"/>
+            <a:endParaRPr lang="en-US" dirty="0"/>
+          </a:p>
+          <a:p>
+            <a:pPr lvl="1"/>
+            <a:endParaRPr lang="en-US" dirty="0" smtClean="0"/>
+          </a:p>
+          <a:p>
+            <a:pPr lvl="1"/>
+            <a:endParaRPr lang="en-US" dirty="0" smtClean="0"/>
+          </a:p>
+          <a:p>
+            <a:pPr lvl="1"/>
+            <a:r>
+              <a:rPr lang="en-US" dirty="0" smtClean="0"/>
+              <a:t>Options:</a:t>
+            </a:r>
+          </a:p>
+          <a:p>
+            <a:pPr lvl="1"/>
+            <a:r>
+              <a:rPr lang="en-US" dirty="0" smtClean="0"/>
+              <a:t>Y Parameter: </a:t>
+            </a:r>
+            <a:r>
+              <a:rPr lang="en-US" dirty="0" err="1" smtClean="0"/>
+              <a:t>Input/Output</a:t>
+            </a:r>
+            <a:r>
+              <a:rPr lang="en-US" dirty="0" smtClean="0"/>
+              <a:t> Reflection, Gain, Reverse Gain, Pin, Pout</a:t>
+            </a:r>
+          </a:p>
+          <a:p>
+            <a:pPr lvl="1"/>
+            <a:r>
+              <a:rPr lang="en-US" dirty="0" smtClean="0"/>
+              <a:t>Y Format: dB, mag, </a:t>
+            </a:r>
+            <a:r>
+              <a:rPr lang="en-US" dirty="0" err="1" smtClean="0"/>
+              <a:t>deg</a:t>
+            </a:r>
+            <a:r>
+              <a:rPr lang="en-US" dirty="0" smtClean="0"/>
+              <a:t>, rad, VSWR, </a:t>
+            </a:r>
+            <a:r>
+              <a:rPr lang="en-US" dirty="0" err="1" smtClean="0"/>
+              <a:t>dBm</a:t>
+            </a:r>
+            <a:endParaRPr lang="en-US" dirty="0" smtClean="0"/>
+          </a:p>
+          <a:p>
+            <a:pPr lvl="1"/>
+            <a:r>
+              <a:rPr lang="en-US" dirty="0" smtClean="0"/>
+              <a:t>X Parameter: vs Frequency, vs Power</a:t>
+            </a:r>
+          </a:p>
+          <a:p>
+            <a:pPr lvl="1"/>
+            <a:r>
+              <a:rPr lang="en-US" dirty="0" smtClean="0"/>
+              <a:t>At: Maximum Gain, Compression, Specific Frequency, Specific Power</a:t>
+            </a:r>
+          </a:p>
+          <a:p>
+            <a:pPr lvl="1"/>
+            <a:endParaRPr lang="en-US" dirty="0" smtClean="0"/>
+          </a:p>
+          <a:p>
+            <a:pPr lvl="1"/>
+            <a:endParaRPr lang="en-US" dirty="0"/>
           </a:p>
         </p:txBody>
       </p:sp>
@@ -7672,7 +6949,7 @@
           <a:p>
             <a:fld id="{FB1601E7-E2BE-4CD1-8EDF-048B8A04B4E7}" type="datetime1">
               <a:rPr lang="de-DE" smtClean="0"/>
-              <a:t>17.08.2015</a:t>
+              <a:t>24.09.2015</a:t>
             </a:fld>
             <a:endParaRPr lang="en-US" dirty="0" smtClean="0"/>
           </a:p>
@@ -7726,7 +7003,7 @@
       </p:sp>
       <p:pic>
         <p:nvPicPr>
-          <p:cNvPr id="9" name="Picture 8"/>
+          <p:cNvPr id="8" name="Picture 7"/>
           <p:cNvPicPr>
             <a:picLocks noChangeAspect="1"/>
           </p:cNvPicPr>
@@ -7746,8 +7023,8 @@
         </p:blipFill>
         <p:spPr>
           <a:xfrm>
-            <a:off x="1828800" y="2039112"/>
-            <a:ext cx="5486400" cy="3679424"/>
+            <a:off x="1906994" y="2095411"/>
+            <a:ext cx="5906012" cy="1028789"/>
           </a:xfrm>
           <a:prstGeom prst="rect">
             <a:avLst/>
@@ -7757,7 +7034,7 @@
     </p:spTree>
     <p:extLst>
       <p:ext uri="{BB962C8B-B14F-4D97-AF65-F5344CB8AC3E}">
-        <p14:creationId xmlns:p14="http://schemas.microsoft.com/office/powerpoint/2010/main" val="348427891"/>
+        <p14:creationId xmlns:p14="http://schemas.microsoft.com/office/powerpoint/2010/main" val="2597425402"/>
       </p:ext>
     </p:extLst>
   </p:cSld>
@@ -7832,25 +7109,57 @@
           <a:bodyPr/>
           <a:lstStyle/>
           <a:p>
-            <a:r>
-              <a:rPr lang="en-US" dirty="0" smtClean="0"/>
-              <a:t>Current version of the software:</a:t>
-            </a:r>
+            <a:pPr marL="342900" indent="-342900">
+              <a:buFont typeface="+mj-lt"/>
+              <a:buAutoNum type="arabicPeriod" startAt="2"/>
+            </a:pPr>
+            <a:r>
+              <a:rPr lang="en-US" dirty="0" smtClean="0"/>
+              <a:t>Plot Generation</a:t>
+            </a:r>
+          </a:p>
+          <a:p>
+            <a:pPr lvl="1"/>
+            <a:r>
+              <a:rPr lang="en-US" dirty="0" smtClean="0"/>
+              <a:t>Option 1 – Keep current plot selection tool, generate plots on VNA</a:t>
+            </a:r>
+          </a:p>
+          <a:p>
+            <a:pPr lvl="1"/>
             <a:endParaRPr lang="en-US" dirty="0"/>
           </a:p>
           <a:p>
             <a:pPr lvl="1"/>
-            <a:r>
-              <a:rPr lang="en-US" dirty="0" smtClean="0"/>
-              <a:t>Generate common plots</a:t>
-            </a:r>
+            <a:endParaRPr lang="en-US" dirty="0" smtClean="0"/>
           </a:p>
           <a:p>
             <a:pPr lvl="1"/>
-            <a:r>
-              <a:rPr lang="en-US" dirty="0" smtClean="0"/>
-              <a:t>Print to PDF</a:t>
-            </a:r>
+            <a:endParaRPr lang="en-US" dirty="0"/>
+          </a:p>
+          <a:p>
+            <a:pPr lvl="1"/>
+            <a:endParaRPr lang="en-US" dirty="0" smtClean="0"/>
+          </a:p>
+          <a:p>
+            <a:pPr lvl="1"/>
+            <a:endParaRPr lang="en-US" dirty="0"/>
+          </a:p>
+          <a:p>
+            <a:pPr lvl="1"/>
+            <a:r>
+              <a:rPr lang="en-US" dirty="0" smtClean="0"/>
+              <a:t>Option 2 - </a:t>
+            </a:r>
+            <a:endParaRPr lang="en-US" dirty="0" smtClean="0"/>
+          </a:p>
+          <a:p>
+            <a:pPr lvl="1"/>
+            <a:endParaRPr lang="en-US" dirty="0" smtClean="0"/>
+          </a:p>
+          <a:p>
+            <a:pPr lvl="1"/>
+            <a:endParaRPr lang="en-US" dirty="0"/>
           </a:p>
         </p:txBody>
       </p:sp>
@@ -7871,7 +7180,7 @@
           <a:p>
             <a:fld id="{FB1601E7-E2BE-4CD1-8EDF-048B8A04B4E7}" type="datetime1">
               <a:rPr lang="de-DE" smtClean="0"/>
-              <a:t>17.08.2015</a:t>
+              <a:t>24.09.2015</a:t>
             </a:fld>
             <a:endParaRPr lang="en-US" dirty="0" smtClean="0"/>
           </a:p>
@@ -7945,8 +7254,8 @@
         </p:blipFill>
         <p:spPr>
           <a:xfrm>
-            <a:off x="1828800" y="2039112"/>
-            <a:ext cx="5486400" cy="4131168"/>
+            <a:off x="1906994" y="1828800"/>
+            <a:ext cx="5906012" cy="1028789"/>
           </a:xfrm>
           <a:prstGeom prst="rect">
             <a:avLst/>
@@ -7956,711 +7265,7 @@
     </p:spTree>
     <p:extLst>
       <p:ext uri="{BB962C8B-B14F-4D97-AF65-F5344CB8AC3E}">
-        <p14:creationId xmlns:p14="http://schemas.microsoft.com/office/powerpoint/2010/main" val="1143514632"/>
-      </p:ext>
-    </p:extLst>
-  </p:cSld>
-  <p:clrMapOvr>
-    <a:masterClrMapping/>
-  </p:clrMapOvr>
-</p:sld>
-</file>
-
-<file path=ppt/slides/slide7.xml><?xml version="1.0" encoding="utf-8"?>
-<p:sld xmlns:a="http://schemas.openxmlformats.org/drawingml/2006/main" xmlns:r="http://schemas.openxmlformats.org/officeDocument/2006/relationships" xmlns:p="http://schemas.openxmlformats.org/presentationml/2006/main">
-  <p:cSld>
-    <p:spTree>
-      <p:nvGrpSpPr>
-        <p:cNvPr id="1" name=""/>
-        <p:cNvGrpSpPr/>
-        <p:nvPr/>
-      </p:nvGrpSpPr>
-      <p:grpSpPr>
-        <a:xfrm>
-          <a:off x="0" y="0"/>
-          <a:ext cx="0" cy="0"/>
-          <a:chOff x="0" y="0"/>
-          <a:chExt cx="0" cy="0"/>
-        </a:xfrm>
-      </p:grpSpPr>
-      <p:sp>
-        <p:nvSpPr>
-          <p:cNvPr id="2" name="Title 1"/>
-          <p:cNvSpPr>
-            <a:spLocks noGrp="1"/>
-          </p:cNvSpPr>
-          <p:nvPr>
-            <p:ph type="title"/>
-          </p:nvPr>
-        </p:nvSpPr>
-        <p:spPr>
-          <a:xfrm>
-            <a:off x="360000" y="216000"/>
-            <a:ext cx="8280000" cy="721307"/>
-          </a:xfrm>
-        </p:spPr>
-        <p:txBody>
-          <a:bodyPr/>
-          <a:lstStyle/>
-          <a:p>
-            <a:r>
-              <a:rPr lang="en-US" dirty="0" smtClean="0"/>
-              <a:t>PA Compression Test</a:t>
-            </a:r>
-            <a:endParaRPr lang="en-US" dirty="0"/>
-          </a:p>
-        </p:txBody>
-      </p:sp>
-      <p:sp>
-        <p:nvSpPr>
-          <p:cNvPr id="3" name="Content Placeholder 2"/>
-          <p:cNvSpPr>
-            <a:spLocks noGrp="1"/>
-          </p:cNvSpPr>
-          <p:nvPr>
-            <p:ph idx="1"/>
-          </p:nvPr>
-        </p:nvSpPr>
-        <p:spPr>
-          <a:xfrm>
-            <a:off x="360000" y="937307"/>
-            <a:ext cx="8280000" cy="5110694"/>
-          </a:xfrm>
-        </p:spPr>
-        <p:txBody>
-          <a:bodyPr/>
-          <a:lstStyle/>
-          <a:p>
-            <a:r>
-              <a:rPr lang="en-US" dirty="0" smtClean="0"/>
-              <a:t>Current version of the software:</a:t>
-            </a:r>
-          </a:p>
-          <a:p>
-            <a:endParaRPr lang="en-US" dirty="0"/>
-          </a:p>
-          <a:p>
-            <a:endParaRPr lang="en-US" dirty="0" smtClean="0"/>
-          </a:p>
-          <a:p>
-            <a:endParaRPr lang="en-US" dirty="0" smtClean="0"/>
-          </a:p>
-          <a:p>
-            <a:endParaRPr lang="en-US" dirty="0"/>
-          </a:p>
-          <a:p>
-            <a:endParaRPr lang="en-US" dirty="0"/>
-          </a:p>
-          <a:p>
-            <a:r>
-              <a:rPr lang="en-US" dirty="0" smtClean="0"/>
-              <a:t>Open/Save</a:t>
-            </a:r>
-          </a:p>
-          <a:p>
-            <a:pPr lvl="1"/>
-            <a:r>
-              <a:rPr lang="en-US" dirty="0" smtClean="0"/>
-              <a:t>Reload results into application to generate plots later</a:t>
-            </a:r>
-          </a:p>
-          <a:p>
-            <a:pPr lvl="1"/>
-            <a:endParaRPr lang="en-US" dirty="0"/>
-          </a:p>
-          <a:p>
-            <a:pPr lvl="1"/>
-            <a:endParaRPr lang="en-US" dirty="0" smtClean="0"/>
-          </a:p>
-          <a:p>
-            <a:r>
-              <a:rPr lang="en-US" dirty="0" smtClean="0"/>
-              <a:t>Export data</a:t>
-            </a:r>
-          </a:p>
-          <a:p>
-            <a:pPr lvl="1"/>
-            <a:r>
-              <a:rPr lang="en-US" dirty="0" smtClean="0"/>
-              <a:t>CSV, Touchstone files of data</a:t>
-            </a:r>
-          </a:p>
-        </p:txBody>
-      </p:sp>
-      <p:sp>
-        <p:nvSpPr>
-          <p:cNvPr id="4" name="Date Placeholder 3"/>
-          <p:cNvSpPr>
-            <a:spLocks noGrp="1"/>
-          </p:cNvSpPr>
-          <p:nvPr>
-            <p:ph type="dt" sz="half" idx="10"/>
-          </p:nvPr>
-        </p:nvSpPr>
-        <p:spPr/>
-        <p:txBody>
-          <a:bodyPr/>
-          <a:lstStyle/>
-          <a:p>
-            <a:fld id="{FB1601E7-E2BE-4CD1-8EDF-048B8A04B4E7}" type="datetime1">
-              <a:rPr lang="de-DE" smtClean="0"/>
-              <a:t>17.08.2015</a:t>
-            </a:fld>
-            <a:endParaRPr lang="en-US" dirty="0" smtClean="0"/>
-          </a:p>
-        </p:txBody>
-      </p:sp>
-      <p:sp>
-        <p:nvSpPr>
-          <p:cNvPr id="5" name="Footer Placeholder 4"/>
-          <p:cNvSpPr>
-            <a:spLocks noGrp="1"/>
-          </p:cNvSpPr>
-          <p:nvPr>
-            <p:ph type="ftr" sz="quarter" idx="11"/>
-          </p:nvPr>
-        </p:nvSpPr>
-        <p:spPr/>
-        <p:txBody>
-          <a:bodyPr/>
-          <a:lstStyle/>
-          <a:p>
-            <a:r>
-              <a:rPr lang="en-US" smtClean="0"/>
-              <a:t>Footer: &gt;Insert &gt;Header &amp; Footer</a:t>
-            </a:r>
-            <a:endParaRPr lang="en-US" dirty="0" smtClean="0"/>
-          </a:p>
-        </p:txBody>
-      </p:sp>
-      <p:sp>
-        <p:nvSpPr>
-          <p:cNvPr id="6" name="Slide Number Placeholder 5"/>
-          <p:cNvSpPr>
-            <a:spLocks noGrp="1"/>
-          </p:cNvSpPr>
-          <p:nvPr>
-            <p:ph type="sldNum" sz="quarter" idx="12"/>
-          </p:nvPr>
-        </p:nvSpPr>
-        <p:spPr/>
-        <p:txBody>
-          <a:bodyPr/>
-          <a:lstStyle/>
-          <a:p>
-            <a:fld id="{57CB76AC-E5DF-427C-ABDC-2F4FBD8E4B69}" type="slidenum">
-              <a:rPr lang="en-US" smtClean="0"/>
-              <a:t>7</a:t>
-            </a:fld>
-            <a:endParaRPr lang="en-US" dirty="0"/>
-          </a:p>
-        </p:txBody>
-      </p:sp>
-      <p:pic>
-        <p:nvPicPr>
-          <p:cNvPr id="9" name="Picture 3"/>
-          <p:cNvPicPr>
-            <a:picLocks noChangeAspect="1" noChangeArrowheads="1"/>
-          </p:cNvPicPr>
-          <p:nvPr/>
-        </p:nvPicPr>
-        <p:blipFill>
-          <a:blip r:embed="rId2">
-            <a:extLst>
-              <a:ext uri="{28A0092B-C50C-407E-A947-70E740481C1C}">
-                <a14:useLocalDpi xmlns:a14="http://schemas.microsoft.com/office/drawing/2010/main" val="0"/>
-              </a:ext>
-            </a:extLst>
-          </a:blip>
-          <a:srcRect/>
-          <a:stretch>
-            <a:fillRect/>
-          </a:stretch>
-        </p:blipFill>
-        <p:spPr bwMode="auto">
-          <a:xfrm>
-            <a:off x="533400" y="1270424"/>
-            <a:ext cx="1587272" cy="1273371"/>
-          </a:xfrm>
-          <a:prstGeom prst="rect">
-            <a:avLst/>
-          </a:prstGeom>
-          <a:noFill/>
-          <a:ln w="9525">
-            <a:solidFill>
-              <a:srgbClr val="00B0F0"/>
-            </a:solidFill>
-            <a:miter lim="800000"/>
-            <a:headEnd/>
-            <a:tailEnd/>
-          </a:ln>
-          <a:extLst>
-            <a:ext uri="{909E8E84-426E-40DD-AFC4-6F175D3DCCD1}">
-              <a14:hiddenFill xmlns:a14="http://schemas.microsoft.com/office/drawing/2010/main">
-                <a:solidFill>
-                  <a:schemeClr val="accent1"/>
-                </a:solidFill>
-              </a14:hiddenFill>
-            </a:ext>
-          </a:extLst>
-        </p:spPr>
-      </p:pic>
-      <p:pic>
-        <p:nvPicPr>
-          <p:cNvPr id="10" name="Picture 4"/>
-          <p:cNvPicPr>
-            <a:picLocks noChangeAspect="1" noChangeArrowheads="1"/>
-          </p:cNvPicPr>
-          <p:nvPr/>
-        </p:nvPicPr>
-        <p:blipFill>
-          <a:blip r:embed="rId3">
-            <a:extLst>
-              <a:ext uri="{28A0092B-C50C-407E-A947-70E740481C1C}">
-                <a14:useLocalDpi xmlns:a14="http://schemas.microsoft.com/office/drawing/2010/main" val="0"/>
-              </a:ext>
-            </a:extLst>
-          </a:blip>
-          <a:srcRect/>
-          <a:stretch>
-            <a:fillRect/>
-          </a:stretch>
-        </p:blipFill>
-        <p:spPr bwMode="auto">
-          <a:xfrm>
-            <a:off x="533400" y="3492654"/>
-            <a:ext cx="1587272" cy="298215"/>
-          </a:xfrm>
-          <a:prstGeom prst="rect">
-            <a:avLst/>
-          </a:prstGeom>
-          <a:noFill/>
-          <a:ln w="9525">
-            <a:solidFill>
-              <a:srgbClr val="00B0F0"/>
-            </a:solidFill>
-            <a:miter lim="800000"/>
-            <a:headEnd/>
-            <a:tailEnd/>
-          </a:ln>
-          <a:extLst>
-            <a:ext uri="{909E8E84-426E-40DD-AFC4-6F175D3DCCD1}">
-              <a14:hiddenFill xmlns:a14="http://schemas.microsoft.com/office/drawing/2010/main">
-                <a:solidFill>
-                  <a:schemeClr val="accent1"/>
-                </a:solidFill>
-              </a14:hiddenFill>
-            </a:ext>
-          </a:extLst>
-        </p:spPr>
-      </p:pic>
-      <p:pic>
-        <p:nvPicPr>
-          <p:cNvPr id="11" name="Picture 5"/>
-          <p:cNvPicPr>
-            <a:picLocks noChangeAspect="1" noChangeArrowheads="1"/>
-          </p:cNvPicPr>
-          <p:nvPr/>
-        </p:nvPicPr>
-        <p:blipFill>
-          <a:blip r:embed="rId4">
-            <a:extLst>
-              <a:ext uri="{28A0092B-C50C-407E-A947-70E740481C1C}">
-                <a14:useLocalDpi xmlns:a14="http://schemas.microsoft.com/office/drawing/2010/main" val="0"/>
-              </a:ext>
-            </a:extLst>
-          </a:blip>
-          <a:srcRect/>
-          <a:stretch>
-            <a:fillRect/>
-          </a:stretch>
-        </p:blipFill>
-        <p:spPr bwMode="auto">
-          <a:xfrm>
-            <a:off x="538655" y="4720984"/>
-            <a:ext cx="1587272" cy="1190454"/>
-          </a:xfrm>
-          <a:prstGeom prst="rect">
-            <a:avLst/>
-          </a:prstGeom>
-          <a:noFill/>
-          <a:ln w="9525">
-            <a:solidFill>
-              <a:srgbClr val="00B0F0"/>
-            </a:solidFill>
-            <a:miter lim="800000"/>
-            <a:headEnd/>
-            <a:tailEnd/>
-          </a:ln>
-          <a:extLst>
-            <a:ext uri="{909E8E84-426E-40DD-AFC4-6F175D3DCCD1}">
-              <a14:hiddenFill xmlns:a14="http://schemas.microsoft.com/office/drawing/2010/main">
-                <a:solidFill>
-                  <a:schemeClr val="accent1"/>
-                </a:solidFill>
-              </a14:hiddenFill>
-            </a:ext>
-          </a:extLst>
-        </p:spPr>
-      </p:pic>
-    </p:spTree>
-    <p:extLst>
-      <p:ext uri="{BB962C8B-B14F-4D97-AF65-F5344CB8AC3E}">
-        <p14:creationId xmlns:p14="http://schemas.microsoft.com/office/powerpoint/2010/main" val="3093673786"/>
-      </p:ext>
-    </p:extLst>
-  </p:cSld>
-  <p:clrMapOvr>
-    <a:masterClrMapping/>
-  </p:clrMapOvr>
-</p:sld>
-</file>
-
-<file path=ppt/slides/slide8.xml><?xml version="1.0" encoding="utf-8"?>
-<p:sld xmlns:a="http://schemas.openxmlformats.org/drawingml/2006/main" xmlns:r="http://schemas.openxmlformats.org/officeDocument/2006/relationships" xmlns:p="http://schemas.openxmlformats.org/presentationml/2006/main">
-  <p:cSld>
-    <p:spTree>
-      <p:nvGrpSpPr>
-        <p:cNvPr id="1" name=""/>
-        <p:cNvGrpSpPr/>
-        <p:nvPr/>
-      </p:nvGrpSpPr>
-      <p:grpSpPr>
-        <a:xfrm>
-          <a:off x="0" y="0"/>
-          <a:ext cx="0" cy="0"/>
-          <a:chOff x="0" y="0"/>
-          <a:chExt cx="0" cy="0"/>
-        </a:xfrm>
-      </p:grpSpPr>
-      <p:sp>
-        <p:nvSpPr>
-          <p:cNvPr id="2" name="Date Placeholder 1"/>
-          <p:cNvSpPr>
-            <a:spLocks noGrp="1"/>
-          </p:cNvSpPr>
-          <p:nvPr>
-            <p:ph type="dt" sz="half" idx="10"/>
-          </p:nvPr>
-        </p:nvSpPr>
-        <p:spPr/>
-        <p:txBody>
-          <a:bodyPr/>
-          <a:lstStyle/>
-          <a:p>
-            <a:fld id="{346C3B9F-B113-479C-BFF8-AB0A13549411}" type="datetime1">
-              <a:rPr lang="de-DE" smtClean="0"/>
-              <a:t>17.08.2015</a:t>
-            </a:fld>
-            <a:endParaRPr lang="en-US" dirty="0" smtClean="0"/>
-          </a:p>
-        </p:txBody>
-      </p:sp>
-      <p:sp>
-        <p:nvSpPr>
-          <p:cNvPr id="3" name="Footer Placeholder 2"/>
-          <p:cNvSpPr>
-            <a:spLocks noGrp="1"/>
-          </p:cNvSpPr>
-          <p:nvPr>
-            <p:ph type="ftr" sz="quarter" idx="11"/>
-          </p:nvPr>
-        </p:nvSpPr>
-        <p:spPr/>
-        <p:txBody>
-          <a:bodyPr/>
-          <a:lstStyle/>
-          <a:p>
-            <a:r>
-              <a:rPr lang="en-US" smtClean="0"/>
-              <a:t>Footer: &gt;Insert &gt;Header &amp; Footer</a:t>
-            </a:r>
-            <a:endParaRPr lang="en-US" dirty="0" smtClean="0"/>
-          </a:p>
-        </p:txBody>
-      </p:sp>
-      <p:sp>
-        <p:nvSpPr>
-          <p:cNvPr id="4" name="Slide Number Placeholder 3"/>
-          <p:cNvSpPr>
-            <a:spLocks noGrp="1"/>
-          </p:cNvSpPr>
-          <p:nvPr>
-            <p:ph type="sldNum" sz="quarter" idx="12"/>
-          </p:nvPr>
-        </p:nvSpPr>
-        <p:spPr/>
-        <p:txBody>
-          <a:bodyPr/>
-          <a:lstStyle/>
-          <a:p>
-            <a:fld id="{57CB76AC-E5DF-427C-ABDC-2F4FBD8E4B69}" type="slidenum">
-              <a:rPr lang="en-US" smtClean="0"/>
-              <a:t>8</a:t>
-            </a:fld>
-            <a:endParaRPr lang="en-US" dirty="0"/>
-          </a:p>
-        </p:txBody>
-      </p:sp>
-      <p:sp>
-        <p:nvSpPr>
-          <p:cNvPr id="5" name="Title 4"/>
-          <p:cNvSpPr>
-            <a:spLocks noGrp="1"/>
-          </p:cNvSpPr>
-          <p:nvPr>
-            <p:ph type="title"/>
-          </p:nvPr>
-        </p:nvSpPr>
-        <p:spPr/>
-        <p:txBody>
-          <a:bodyPr/>
-          <a:lstStyle/>
-          <a:p>
-            <a:r>
-              <a:rPr lang="en-US" dirty="0" smtClean="0"/>
-              <a:t>PA Compression Test Software</a:t>
-            </a:r>
-            <a:br>
-              <a:rPr lang="en-US" dirty="0" smtClean="0"/>
-            </a:br>
-            <a:r>
-              <a:rPr lang="en-US" dirty="0" smtClean="0"/>
-              <a:t>Improvements</a:t>
-            </a:r>
-            <a:endParaRPr lang="en-US" dirty="0"/>
-          </a:p>
-        </p:txBody>
-      </p:sp>
-    </p:spTree>
-    <p:extLst>
-      <p:ext uri="{BB962C8B-B14F-4D97-AF65-F5344CB8AC3E}">
-        <p14:creationId xmlns:p14="http://schemas.microsoft.com/office/powerpoint/2010/main" val="162766856"/>
-      </p:ext>
-    </p:extLst>
-  </p:cSld>
-  <p:clrMapOvr>
-    <a:masterClrMapping/>
-  </p:clrMapOvr>
-</p:sld>
-</file>
-
-<file path=ppt/slides/slide9.xml><?xml version="1.0" encoding="utf-8"?>
-<p:sld xmlns:a="http://schemas.openxmlformats.org/drawingml/2006/main" xmlns:r="http://schemas.openxmlformats.org/officeDocument/2006/relationships" xmlns:p="http://schemas.openxmlformats.org/presentationml/2006/main">
-  <p:cSld>
-    <p:spTree>
-      <p:nvGrpSpPr>
-        <p:cNvPr id="1" name=""/>
-        <p:cNvGrpSpPr/>
-        <p:nvPr/>
-      </p:nvGrpSpPr>
-      <p:grpSpPr>
-        <a:xfrm>
-          <a:off x="0" y="0"/>
-          <a:ext cx="0" cy="0"/>
-          <a:chOff x="0" y="0"/>
-          <a:chExt cx="0" cy="0"/>
-        </a:xfrm>
-      </p:grpSpPr>
-      <p:sp>
-        <p:nvSpPr>
-          <p:cNvPr id="2" name="Title 1"/>
-          <p:cNvSpPr>
-            <a:spLocks noGrp="1"/>
-          </p:cNvSpPr>
-          <p:nvPr>
-            <p:ph type="title"/>
-          </p:nvPr>
-        </p:nvSpPr>
-        <p:spPr>
-          <a:xfrm>
-            <a:off x="360000" y="216000"/>
-            <a:ext cx="8280000" cy="721307"/>
-          </a:xfrm>
-        </p:spPr>
-        <p:txBody>
-          <a:bodyPr/>
-          <a:lstStyle/>
-          <a:p>
-            <a:r>
-              <a:rPr lang="en-US" dirty="0" smtClean="0"/>
-              <a:t>PA Compression Test</a:t>
-            </a:r>
-            <a:endParaRPr lang="en-US" dirty="0"/>
-          </a:p>
-        </p:txBody>
-      </p:sp>
-      <p:sp>
-        <p:nvSpPr>
-          <p:cNvPr id="3" name="Content Placeholder 2"/>
-          <p:cNvSpPr>
-            <a:spLocks noGrp="1"/>
-          </p:cNvSpPr>
-          <p:nvPr>
-            <p:ph idx="1"/>
-          </p:nvPr>
-        </p:nvSpPr>
-        <p:spPr>
-          <a:xfrm>
-            <a:off x="360000" y="937307"/>
-            <a:ext cx="8280000" cy="5110694"/>
-          </a:xfrm>
-        </p:spPr>
-        <p:txBody>
-          <a:bodyPr/>
-          <a:lstStyle/>
-          <a:p>
-            <a:r>
-              <a:rPr lang="en-US" dirty="0" smtClean="0"/>
-              <a:t>In progress:</a:t>
-            </a:r>
-          </a:p>
-          <a:p>
-            <a:pPr lvl="1"/>
-            <a:r>
-              <a:rPr lang="en-US" dirty="0" smtClean="0"/>
-              <a:t>Calculate compression from Maximum Gain (Gain expansion)</a:t>
-            </a:r>
-            <a:endParaRPr lang="en-US" dirty="0"/>
-          </a:p>
-        </p:txBody>
-      </p:sp>
-      <p:sp>
-        <p:nvSpPr>
-          <p:cNvPr id="4" name="Date Placeholder 3"/>
-          <p:cNvSpPr>
-            <a:spLocks noGrp="1"/>
-          </p:cNvSpPr>
-          <p:nvPr>
-            <p:ph type="dt" sz="half" idx="10"/>
-          </p:nvPr>
-        </p:nvSpPr>
-        <p:spPr/>
-        <p:txBody>
-          <a:bodyPr/>
-          <a:lstStyle/>
-          <a:p>
-            <a:fld id="{FB1601E7-E2BE-4CD1-8EDF-048B8A04B4E7}" type="datetime1">
-              <a:rPr lang="de-DE" smtClean="0"/>
-              <a:t>17.08.2015</a:t>
-            </a:fld>
-            <a:endParaRPr lang="en-US" dirty="0" smtClean="0"/>
-          </a:p>
-        </p:txBody>
-      </p:sp>
-      <p:sp>
-        <p:nvSpPr>
-          <p:cNvPr id="5" name="Footer Placeholder 4"/>
-          <p:cNvSpPr>
-            <a:spLocks noGrp="1"/>
-          </p:cNvSpPr>
-          <p:nvPr>
-            <p:ph type="ftr" sz="quarter" idx="11"/>
-          </p:nvPr>
-        </p:nvSpPr>
-        <p:spPr/>
-        <p:txBody>
-          <a:bodyPr/>
-          <a:lstStyle/>
-          <a:p>
-            <a:r>
-              <a:rPr lang="en-US" smtClean="0"/>
-              <a:t>Footer: &gt;Insert &gt;Header &amp; Footer</a:t>
-            </a:r>
-            <a:endParaRPr lang="en-US" dirty="0" smtClean="0"/>
-          </a:p>
-        </p:txBody>
-      </p:sp>
-      <p:sp>
-        <p:nvSpPr>
-          <p:cNvPr id="6" name="Slide Number Placeholder 5"/>
-          <p:cNvSpPr>
-            <a:spLocks noGrp="1"/>
-          </p:cNvSpPr>
-          <p:nvPr>
-            <p:ph type="sldNum" sz="quarter" idx="12"/>
-          </p:nvPr>
-        </p:nvSpPr>
-        <p:spPr/>
-        <p:txBody>
-          <a:bodyPr/>
-          <a:lstStyle/>
-          <a:p>
-            <a:fld id="{57CB76AC-E5DF-427C-ABDC-2F4FBD8E4B69}" type="slidenum">
-              <a:rPr lang="en-US" smtClean="0"/>
-              <a:t>9</a:t>
-            </a:fld>
-            <a:endParaRPr lang="en-US" dirty="0"/>
-          </a:p>
-        </p:txBody>
-      </p:sp>
-      <p:pic>
-        <p:nvPicPr>
-          <p:cNvPr id="7" name="Picture 6"/>
-          <p:cNvPicPr>
-            <a:picLocks noChangeAspect="1"/>
-          </p:cNvPicPr>
-          <p:nvPr/>
-        </p:nvPicPr>
-        <p:blipFill>
-          <a:blip r:embed="rId2">
-            <a:extLst>
-              <a:ext uri="{28A0092B-C50C-407E-A947-70E740481C1C}">
-                <a14:useLocalDpi xmlns:a14="http://schemas.microsoft.com/office/drawing/2010/main" val="0"/>
-              </a:ext>
-            </a:extLst>
-          </a:blip>
-          <a:stretch>
-            <a:fillRect/>
-          </a:stretch>
-        </p:blipFill>
-        <p:spPr>
-          <a:xfrm>
-            <a:off x="1828800" y="2039112"/>
-            <a:ext cx="5486400" cy="3648850"/>
-          </a:xfrm>
-          <a:prstGeom prst="rect">
-            <a:avLst/>
-          </a:prstGeom>
-        </p:spPr>
-      </p:pic>
-      <p:cxnSp>
-        <p:nvCxnSpPr>
-          <p:cNvPr id="10" name="Straight Arrow Connector 9"/>
-          <p:cNvCxnSpPr/>
-          <p:nvPr/>
-        </p:nvCxnSpPr>
-        <p:spPr>
-          <a:xfrm>
-            <a:off x="1524000" y="5148072"/>
-            <a:ext cx="1485021" cy="0"/>
-          </a:xfrm>
-          <a:prstGeom prst="straightConnector1">
-            <a:avLst/>
-          </a:prstGeom>
-          <a:ln w="38100">
-            <a:tailEnd type="triangle"/>
-          </a:ln>
-        </p:spPr>
-        <p:style>
-          <a:lnRef idx="1">
-            <a:schemeClr val="accent1"/>
-          </a:lnRef>
-          <a:fillRef idx="0">
-            <a:schemeClr val="accent1"/>
-          </a:fillRef>
-          <a:effectRef idx="0">
-            <a:schemeClr val="accent1"/>
-          </a:effectRef>
-          <a:fontRef idx="minor">
-            <a:schemeClr val="tx1"/>
-          </a:fontRef>
-        </p:style>
-      </p:cxnSp>
-    </p:spTree>
-    <p:extLst>
-      <p:ext uri="{BB962C8B-B14F-4D97-AF65-F5344CB8AC3E}">
-        <p14:creationId xmlns:p14="http://schemas.microsoft.com/office/powerpoint/2010/main" val="1234469650"/>
+        <p14:creationId xmlns:p14="http://schemas.microsoft.com/office/powerpoint/2010/main" val="1548359802"/>
       </p:ext>
     </p:extLst>
   </p:cSld>

</xml_diff>

<commit_message>
Added a few extra images, changes to v2.0 Prototype for tomorrow's webex with M/A-COM
</commit_message>
<xml_diff>
--- a/Screenshots/v2.0 Prototype/MA-COM PA Compression Test Software.pptx
+++ b/Screenshots/v2.0 Prototype/MA-COM PA Compression Test Software.pptx
@@ -5,10 +5,10 @@
     <p:sldMasterId id="2147483744" r:id="rId1"/>
   </p:sldMasterIdLst>
   <p:notesMasterIdLst>
-    <p:notesMasterId r:id="rId8"/>
+    <p:notesMasterId r:id="rId11"/>
   </p:notesMasterIdLst>
   <p:handoutMasterIdLst>
-    <p:handoutMasterId r:id="rId9"/>
+    <p:handoutMasterId r:id="rId12"/>
   </p:handoutMasterIdLst>
   <p:sldIdLst>
     <p:sldId id="287" r:id="rId2"/>
@@ -16,7 +16,10 @@
     <p:sldId id="289" r:id="rId4"/>
     <p:sldId id="290" r:id="rId5"/>
     <p:sldId id="291" r:id="rId6"/>
-    <p:sldId id="292" r:id="rId7"/>
+    <p:sldId id="293" r:id="rId7"/>
+    <p:sldId id="292" r:id="rId8"/>
+    <p:sldId id="294" r:id="rId9"/>
+    <p:sldId id="295" r:id="rId10"/>
   </p:sldIdLst>
   <p:sldSz cx="9144000" cy="6858000" type="screen4x3"/>
   <p:notesSz cx="6858000" cy="9144000"/>
@@ -6097,16 +6100,34 @@
           <a:p>
             <a:r>
               <a:rPr lang="en-US" dirty="0" smtClean="0"/>
-              <a:t>VNA Software Developer</a:t>
-            </a:r>
-          </a:p>
-          <a:p>
+              <a:t>VNA Software </a:t>
+            </a:r>
+            <a:r>
+              <a:rPr lang="en-US" dirty="0" smtClean="0"/>
+              <a:t>Developer</a:t>
+            </a:r>
+          </a:p>
+          <a:p>
+            <a:r>
+              <a:rPr lang="en-US" dirty="0" smtClean="0"/>
+              <a:t>Cupertino, CA</a:t>
+            </a:r>
             <a:endParaRPr lang="en-US" dirty="0" smtClean="0"/>
           </a:p>
           <a:p>
-            <a:r>
-              <a:rPr lang="en-US" dirty="0" smtClean="0"/>
-              <a:t>September 25</a:t>
+            <a:endParaRPr lang="en-US" dirty="0" smtClean="0"/>
+          </a:p>
+          <a:p>
+            <a:endParaRPr lang="en-US" dirty="0" smtClean="0"/>
+          </a:p>
+          <a:p>
+            <a:r>
+              <a:rPr lang="en-US" dirty="0" smtClean="0"/>
+              <a:t>September </a:t>
+            </a:r>
+            <a:r>
+              <a:rPr lang="en-US" dirty="0" smtClean="0"/>
+              <a:t>25</a:t>
             </a:r>
             <a:r>
               <a:rPr lang="en-US" baseline="30000" dirty="0" smtClean="0"/>
@@ -6114,11 +6135,7 @@
             </a:r>
             <a:r>
               <a:rPr lang="en-US" dirty="0" smtClean="0"/>
-              <a:t>, </a:t>
-            </a:r>
-            <a:r>
-              <a:rPr lang="en-US" dirty="0" smtClean="0"/>
-              <a:t>2015</a:t>
+              <a:t>, 2015</a:t>
             </a:r>
             <a:endParaRPr lang="en-US" dirty="0"/>
           </a:p>
@@ -6141,14 +6158,15 @@
           <a:p>
             <a:r>
               <a:rPr lang="en-US" dirty="0" smtClean="0"/>
-              <a:t>PA Compression Test Software</a:t>
-            </a:r>
-            <a:br>
-              <a:rPr lang="en-US" dirty="0" smtClean="0"/>
-            </a:br>
-            <a:r>
-              <a:rPr lang="en-US" dirty="0" smtClean="0"/>
-              <a:t>Improvements for M/A-COM</a:t>
+              <a:t>PA Compression </a:t>
+            </a:r>
+            <a:r>
+              <a:rPr lang="en-US" dirty="0" smtClean="0"/>
+              <a:t>Test Software Improvements for </a:t>
+            </a:r>
+            <a:r>
+              <a:rPr lang="en-US" dirty="0" smtClean="0"/>
+              <a:t>M/A-COM</a:t>
             </a:r>
             <a:endParaRPr lang="en-US" dirty="0"/>
           </a:p>
@@ -6231,15 +6249,21 @@
             <a:pPr lvl="1"/>
             <a:r>
               <a:rPr lang="en-US" dirty="0" smtClean="0"/>
-              <a:t>Measurement (Power vs Frequency sweeps)</a:t>
-            </a:r>
+              <a:t>Measurement</a:t>
+            </a:r>
+            <a:endParaRPr lang="en-US" dirty="0" smtClean="0"/>
           </a:p>
           <a:p>
             <a:pPr lvl="1"/>
             <a:r>
               <a:rPr lang="en-US" dirty="0" smtClean="0"/>
-              <a:t>Plot generation</a:t>
-            </a:r>
+              <a:t>Plot </a:t>
+            </a:r>
+            <a:r>
+              <a:rPr lang="en-US" dirty="0" smtClean="0"/>
+              <a:t>generation (on VNA)</a:t>
+            </a:r>
+            <a:endParaRPr lang="en-US" dirty="0" smtClean="0"/>
           </a:p>
           <a:p>
             <a:pPr lvl="1"/>
@@ -6429,7 +6453,7 @@
             </a:r>
             <a:r>
               <a:rPr lang="en-US" dirty="0" smtClean="0"/>
-              <a:t>expansion</a:t>
+              <a:t>expansion </a:t>
             </a:r>
             <a:endParaRPr lang="en-US" dirty="0" smtClean="0"/>
           </a:p>
@@ -6439,7 +6463,6 @@
               <a:rPr lang="en-US" dirty="0" smtClean="0"/>
               <a:t>Accommodate pulsed power conditions</a:t>
             </a:r>
-            <a:endParaRPr lang="en-US" dirty="0" smtClean="0"/>
           </a:p>
           <a:p>
             <a:pPr lvl="1"/>
@@ -6538,7 +6561,7 @@
         </p:blipFill>
         <p:spPr>
           <a:xfrm>
-            <a:off x="2514600" y="2667000"/>
+            <a:off x="2514600" y="2651176"/>
             <a:ext cx="4682100" cy="3140024"/>
           </a:xfrm>
           <a:prstGeom prst="rect">
@@ -6637,8 +6660,9 @@
             <a:pPr lvl="1"/>
             <a:r>
               <a:rPr lang="en-US" dirty="0" smtClean="0"/>
-              <a:t>Current results screen:</a:t>
-            </a:r>
+              <a:t>Current plot mechanism</a:t>
+            </a:r>
+            <a:endParaRPr lang="en-US" dirty="0" smtClean="0"/>
           </a:p>
           <a:p>
             <a:pPr lvl="1"/>
@@ -6868,9 +6892,25 @@
           </a:p>
           <a:p>
             <a:pPr lvl="1"/>
-            <a:r>
-              <a:rPr lang="en-US" dirty="0" smtClean="0"/>
-              <a:t>Options:</a:t>
+            <a:endParaRPr lang="en-US" dirty="0" smtClean="0"/>
+          </a:p>
+          <a:p>
+            <a:pPr lvl="1"/>
+            <a:endParaRPr lang="en-US" dirty="0"/>
+          </a:p>
+          <a:p>
+            <a:pPr lvl="1"/>
+            <a:endParaRPr lang="en-US" dirty="0" smtClean="0"/>
+          </a:p>
+          <a:p>
+            <a:pPr lvl="1"/>
+            <a:r>
+              <a:rPr lang="en-US" dirty="0" smtClean="0"/>
+              <a:t>Options</a:t>
+            </a:r>
+            <a:r>
+              <a:rPr lang="en-US" dirty="0" smtClean="0"/>
+              <a:t>:</a:t>
             </a:r>
           </a:p>
           <a:p>
@@ -7023,7 +7063,7 @@
         </p:blipFill>
         <p:spPr>
           <a:xfrm>
-            <a:off x="1906994" y="2095411"/>
+            <a:off x="1906994" y="2552611"/>
             <a:ext cx="5906012" cy="1028789"/>
           </a:xfrm>
           <a:prstGeom prst="rect">
@@ -7115,14 +7155,38 @@
             </a:pPr>
             <a:r>
               <a:rPr lang="en-US" dirty="0" smtClean="0"/>
-              <a:t>Plot Generation</a:t>
+              <a:t>Plot </a:t>
+            </a:r>
+            <a:r>
+              <a:rPr lang="en-US" dirty="0" smtClean="0"/>
+              <a:t>Generation:</a:t>
             </a:r>
           </a:p>
           <a:p>
             <a:pPr lvl="1"/>
             <a:r>
               <a:rPr lang="en-US" dirty="0" smtClean="0"/>
-              <a:t>Option 1 – Keep current plot selection tool, generate plots on VNA</a:t>
+              <a:t>Write measurement results into two channels with segmented sweeps</a:t>
+            </a:r>
+          </a:p>
+          <a:p>
+            <a:pPr lvl="2">
+              <a:buFont typeface="Arial" panose="020B0604020202020204" pitchFamily="34" charset="0"/>
+              <a:buChar char="•"/>
+            </a:pPr>
+            <a:r>
+              <a:rPr lang="en-US" dirty="0" smtClean="0"/>
+              <a:t>Channel 1: Maximum gain</a:t>
+            </a:r>
+          </a:p>
+          <a:p>
+            <a:pPr lvl="2">
+              <a:buFont typeface="Arial" panose="020B0604020202020204" pitchFamily="34" charset="0"/>
+              <a:buChar char="•"/>
+            </a:pPr>
+            <a:r>
+              <a:rPr lang="en-US" dirty="0" smtClean="0"/>
+              <a:t>Channel 2: Compression</a:t>
             </a:r>
           </a:p>
           <a:p>
@@ -7138,19 +7202,72 @@
             <a:endParaRPr lang="en-US" dirty="0"/>
           </a:p>
           <a:p>
+            <a:pPr marL="180000" lvl="1" indent="0">
+              <a:buNone/>
+            </a:pPr>
+            <a:endParaRPr lang="en-US" dirty="0"/>
+          </a:p>
+          <a:p>
+            <a:pPr marL="180000" lvl="1" indent="0">
+              <a:buNone/>
+            </a:pPr>
+            <a:endParaRPr lang="en-US" dirty="0" smtClean="0"/>
+          </a:p>
+          <a:p>
+            <a:pPr marL="180000" lvl="1" indent="0">
+              <a:buNone/>
+            </a:pPr>
+            <a:endParaRPr lang="en-US" dirty="0"/>
+          </a:p>
+          <a:p>
+            <a:pPr marL="180000" lvl="1" indent="0">
+              <a:buNone/>
+            </a:pPr>
+            <a:endParaRPr lang="en-US" dirty="0"/>
+          </a:p>
+          <a:p>
             <a:pPr lvl="1"/>
-            <a:endParaRPr lang="en-US" dirty="0" smtClean="0"/>
+            <a:r>
+              <a:rPr lang="en-US" dirty="0" smtClean="0"/>
+              <a:t>Benefits of this approach:</a:t>
+            </a:r>
+          </a:p>
+          <a:p>
+            <a:pPr lvl="2">
+              <a:buFont typeface="Arial" panose="020B0604020202020204" pitchFamily="34" charset="0"/>
+              <a:buChar char="•"/>
+            </a:pPr>
+            <a:r>
+              <a:rPr lang="en-US" dirty="0" smtClean="0"/>
+              <a:t>C</a:t>
+            </a:r>
+            <a:r>
+              <a:rPr lang="en-US" dirty="0" smtClean="0"/>
+              <a:t>onfirm, re-measure results</a:t>
+            </a:r>
+          </a:p>
+          <a:p>
+            <a:pPr lvl="2">
+              <a:buFont typeface="Arial" panose="020B0604020202020204" pitchFamily="34" charset="0"/>
+              <a:buChar char="•"/>
+            </a:pPr>
+            <a:r>
+              <a:rPr lang="en-US" dirty="0" smtClean="0"/>
+              <a:t>Use VNA data processing capability</a:t>
+            </a:r>
+          </a:p>
+          <a:p>
+            <a:pPr lvl="2">
+              <a:buFont typeface="Arial" panose="020B0604020202020204" pitchFamily="34" charset="0"/>
+              <a:buChar char="•"/>
+            </a:pPr>
+            <a:r>
+              <a:rPr lang="en-US" dirty="0" smtClean="0"/>
+              <a:t>Data export options available</a:t>
+            </a:r>
           </a:p>
           <a:p>
             <a:pPr lvl="1"/>
-            <a:endParaRPr lang="en-US" dirty="0"/>
-          </a:p>
-          <a:p>
-            <a:pPr lvl="1"/>
-            <a:r>
-              <a:rPr lang="en-US" dirty="0" smtClean="0"/>
-              <a:t>Option 2 - </a:t>
-            </a:r>
             <a:endParaRPr lang="en-US" dirty="0" smtClean="0"/>
           </a:p>
           <a:p>
@@ -7234,7 +7351,747 @@
       </p:sp>
       <p:pic>
         <p:nvPicPr>
-          <p:cNvPr id="8" name="Picture 7"/>
+          <p:cNvPr id="9" name="Picture 8"/>
+          <p:cNvPicPr>
+            <a:picLocks noChangeAspect="1"/>
+          </p:cNvPicPr>
+          <p:nvPr/>
+        </p:nvPicPr>
+        <p:blipFill>
+          <a:blip r:embed="rId2"/>
+          <a:stretch>
+            <a:fillRect/>
+          </a:stretch>
+        </p:blipFill>
+        <p:spPr>
+          <a:xfrm>
+            <a:off x="4888012" y="2514600"/>
+            <a:ext cx="910200" cy="1496895"/>
+          </a:xfrm>
+          <a:prstGeom prst="rect">
+            <a:avLst/>
+          </a:prstGeom>
+        </p:spPr>
+      </p:pic>
+      <p:pic>
+        <p:nvPicPr>
+          <p:cNvPr id="10" name="Picture 9"/>
+          <p:cNvPicPr>
+            <a:picLocks noChangeAspect="1"/>
+          </p:cNvPicPr>
+          <p:nvPr/>
+        </p:nvPicPr>
+        <p:blipFill>
+          <a:blip r:embed="rId3"/>
+          <a:stretch>
+            <a:fillRect/>
+          </a:stretch>
+        </p:blipFill>
+        <p:spPr>
+          <a:xfrm>
+            <a:off x="2209800" y="2514600"/>
+            <a:ext cx="2543958" cy="1491121"/>
+          </a:xfrm>
+          <a:prstGeom prst="rect">
+            <a:avLst/>
+          </a:prstGeom>
+        </p:spPr>
+      </p:pic>
+      <p:sp>
+        <p:nvSpPr>
+          <p:cNvPr id="11" name="Right Brace 10"/>
+          <p:cNvSpPr/>
+          <p:nvPr/>
+        </p:nvSpPr>
+        <p:spPr>
+          <a:xfrm>
+            <a:off x="5822812" y="2716095"/>
+            <a:ext cx="152400" cy="914400"/>
+          </a:xfrm>
+          <a:prstGeom prst="rightBrace">
+            <a:avLst/>
+          </a:prstGeom>
+          <a:ln w="38100"/>
+        </p:spPr>
+        <p:style>
+          <a:lnRef idx="1">
+            <a:schemeClr val="accent1"/>
+          </a:lnRef>
+          <a:fillRef idx="0">
+            <a:schemeClr val="accent1"/>
+          </a:fillRef>
+          <a:effectRef idx="0">
+            <a:schemeClr val="accent1"/>
+          </a:effectRef>
+          <a:fontRef idx="minor">
+            <a:schemeClr val="tx1"/>
+          </a:fontRef>
+        </p:style>
+        <p:txBody>
+          <a:bodyPr rtlCol="0" anchor="ctr"/>
+          <a:lstStyle/>
+          <a:p>
+            <a:pPr algn="ctr"/>
+            <a:endParaRPr lang="en-US"/>
+          </a:p>
+        </p:txBody>
+      </p:sp>
+      <p:sp>
+        <p:nvSpPr>
+          <p:cNvPr id="12" name="TextBox 11"/>
+          <p:cNvSpPr txBox="1"/>
+          <p:nvPr/>
+        </p:nvSpPr>
+        <p:spPr>
+          <a:xfrm>
+            <a:off x="5970332" y="2973240"/>
+            <a:ext cx="1866900" cy="400110"/>
+          </a:xfrm>
+          <a:prstGeom prst="rect">
+            <a:avLst/>
+          </a:prstGeom>
+          <a:noFill/>
+        </p:spPr>
+        <p:txBody>
+          <a:bodyPr wrap="square" rtlCol="0">
+            <a:spAutoFit/>
+          </a:bodyPr>
+          <a:lstStyle/>
+          <a:p>
+            <a:r>
+              <a:rPr lang="en-US" sz="1000" dirty="0" smtClean="0"/>
+              <a:t>P</a:t>
+            </a:r>
+            <a:r>
+              <a:rPr lang="en-US" sz="1000" baseline="-25000" dirty="0" smtClean="0"/>
+              <a:t>in </a:t>
+            </a:r>
+            <a:r>
+              <a:rPr lang="en-US" sz="1000" dirty="0" smtClean="0"/>
+              <a:t>= Max. Gain, Compression vs Frequency</a:t>
+            </a:r>
+            <a:endParaRPr lang="en-US" sz="1000" dirty="0"/>
+          </a:p>
+        </p:txBody>
+      </p:sp>
+    </p:spTree>
+    <p:extLst>
+      <p:ext uri="{BB962C8B-B14F-4D97-AF65-F5344CB8AC3E}">
+        <p14:creationId xmlns:p14="http://schemas.microsoft.com/office/powerpoint/2010/main" val="1139142430"/>
+      </p:ext>
+    </p:extLst>
+  </p:cSld>
+  <p:clrMapOvr>
+    <a:masterClrMapping/>
+  </p:clrMapOvr>
+</p:sld>
+</file>
+
+<file path=ppt/slides/slide7.xml><?xml version="1.0" encoding="utf-8"?>
+<p:sld xmlns:a="http://schemas.openxmlformats.org/drawingml/2006/main" xmlns:r="http://schemas.openxmlformats.org/officeDocument/2006/relationships" xmlns:p="http://schemas.openxmlformats.org/presentationml/2006/main">
+  <p:cSld>
+    <p:spTree>
+      <p:nvGrpSpPr>
+        <p:cNvPr id="1" name=""/>
+        <p:cNvGrpSpPr/>
+        <p:nvPr/>
+      </p:nvGrpSpPr>
+      <p:grpSpPr>
+        <a:xfrm>
+          <a:off x="0" y="0"/>
+          <a:ext cx="0" cy="0"/>
+          <a:chOff x="0" y="0"/>
+          <a:chExt cx="0" cy="0"/>
+        </a:xfrm>
+      </p:grpSpPr>
+      <p:sp>
+        <p:nvSpPr>
+          <p:cNvPr id="2" name="Title 1"/>
+          <p:cNvSpPr>
+            <a:spLocks noGrp="1"/>
+          </p:cNvSpPr>
+          <p:nvPr>
+            <p:ph type="title"/>
+          </p:nvPr>
+        </p:nvSpPr>
+        <p:spPr>
+          <a:xfrm>
+            <a:off x="360000" y="216000"/>
+            <a:ext cx="8280000" cy="721307"/>
+          </a:xfrm>
+        </p:spPr>
+        <p:txBody>
+          <a:bodyPr/>
+          <a:lstStyle/>
+          <a:p>
+            <a:r>
+              <a:rPr lang="en-US" dirty="0" smtClean="0"/>
+              <a:t>PA Compression Test</a:t>
+            </a:r>
+            <a:endParaRPr lang="en-US" dirty="0"/>
+          </a:p>
+        </p:txBody>
+      </p:sp>
+      <p:sp>
+        <p:nvSpPr>
+          <p:cNvPr id="3" name="Content Placeholder 2"/>
+          <p:cNvSpPr>
+            <a:spLocks noGrp="1"/>
+          </p:cNvSpPr>
+          <p:nvPr>
+            <p:ph idx="1"/>
+          </p:nvPr>
+        </p:nvSpPr>
+        <p:spPr>
+          <a:xfrm>
+            <a:off x="360000" y="937307"/>
+            <a:ext cx="8280000" cy="5110694"/>
+          </a:xfrm>
+        </p:spPr>
+        <p:txBody>
+          <a:bodyPr/>
+          <a:lstStyle/>
+          <a:p>
+            <a:pPr marL="342900" indent="-342900">
+              <a:buFont typeface="+mj-lt"/>
+              <a:buAutoNum type="arabicPeriod" startAt="2"/>
+            </a:pPr>
+            <a:r>
+              <a:rPr lang="en-US" dirty="0" smtClean="0"/>
+              <a:t>Plot Generation</a:t>
+            </a:r>
+          </a:p>
+          <a:p>
+            <a:pPr lvl="1"/>
+            <a:r>
+              <a:rPr lang="en-US" dirty="0" smtClean="0"/>
+              <a:t>Option 1 – Keep current plot selection tool, </a:t>
+            </a:r>
+            <a:r>
+              <a:rPr lang="en-US" dirty="0" smtClean="0"/>
+              <a:t>but generate </a:t>
+            </a:r>
+            <a:r>
+              <a:rPr lang="en-US" dirty="0" smtClean="0"/>
+              <a:t>plots on VNA</a:t>
+            </a:r>
+          </a:p>
+          <a:p>
+            <a:pPr lvl="1"/>
+            <a:endParaRPr lang="en-US" dirty="0"/>
+          </a:p>
+          <a:p>
+            <a:pPr lvl="1"/>
+            <a:endParaRPr lang="en-US" dirty="0" smtClean="0"/>
+          </a:p>
+          <a:p>
+            <a:pPr lvl="1"/>
+            <a:endParaRPr lang="en-US" dirty="0"/>
+          </a:p>
+          <a:p>
+            <a:pPr lvl="1"/>
+            <a:endParaRPr lang="en-US" dirty="0" smtClean="0"/>
+          </a:p>
+          <a:p>
+            <a:pPr lvl="1"/>
+            <a:endParaRPr lang="en-US" dirty="0"/>
+          </a:p>
+          <a:p>
+            <a:pPr lvl="1"/>
+            <a:r>
+              <a:rPr lang="en-US" dirty="0" smtClean="0"/>
+              <a:t>Option 2 </a:t>
+            </a:r>
+            <a:r>
+              <a:rPr lang="en-US" dirty="0" smtClean="0"/>
+              <a:t>– Create a separate tool to generate plots on VNA</a:t>
+            </a:r>
+          </a:p>
+          <a:p>
+            <a:pPr lvl="2">
+              <a:buFont typeface="Arial" panose="020B0604020202020204" pitchFamily="34" charset="0"/>
+              <a:buChar char="•"/>
+            </a:pPr>
+            <a:r>
+              <a:rPr lang="en-US" dirty="0" smtClean="0"/>
+              <a:t>Application to save current plot setup, recall plots </a:t>
+            </a:r>
+            <a:r>
+              <a:rPr lang="en-US" dirty="0" smtClean="0"/>
+              <a:t>later</a:t>
+            </a:r>
+            <a:endParaRPr lang="en-US" dirty="0" smtClean="0"/>
+          </a:p>
+          <a:p>
+            <a:pPr lvl="2">
+              <a:buFont typeface="Arial" panose="020B0604020202020204" pitchFamily="34" charset="0"/>
+              <a:buChar char="•"/>
+            </a:pPr>
+            <a:r>
+              <a:rPr lang="en-US" dirty="0" smtClean="0"/>
+              <a:t>M/A-COM-specific PA plot generation script</a:t>
+            </a:r>
+            <a:endParaRPr lang="en-US" dirty="0" smtClean="0"/>
+          </a:p>
+          <a:p>
+            <a:pPr lvl="1"/>
+            <a:endParaRPr lang="en-US" dirty="0" smtClean="0"/>
+          </a:p>
+          <a:p>
+            <a:pPr lvl="1"/>
+            <a:endParaRPr lang="en-US" dirty="0"/>
+          </a:p>
+        </p:txBody>
+      </p:sp>
+      <p:sp>
+        <p:nvSpPr>
+          <p:cNvPr id="4" name="Date Placeholder 3"/>
+          <p:cNvSpPr>
+            <a:spLocks noGrp="1"/>
+          </p:cNvSpPr>
+          <p:nvPr>
+            <p:ph type="dt" sz="half" idx="10"/>
+          </p:nvPr>
+        </p:nvSpPr>
+        <p:spPr/>
+        <p:txBody>
+          <a:bodyPr/>
+          <a:lstStyle/>
+          <a:p>
+            <a:fld id="{FB1601E7-E2BE-4CD1-8EDF-048B8A04B4E7}" type="datetime1">
+              <a:rPr lang="de-DE" smtClean="0"/>
+              <a:t>24.09.2015</a:t>
+            </a:fld>
+            <a:endParaRPr lang="en-US" dirty="0" smtClean="0"/>
+          </a:p>
+        </p:txBody>
+      </p:sp>
+      <p:sp>
+        <p:nvSpPr>
+          <p:cNvPr id="5" name="Footer Placeholder 4"/>
+          <p:cNvSpPr>
+            <a:spLocks noGrp="1"/>
+          </p:cNvSpPr>
+          <p:nvPr>
+            <p:ph type="ftr" sz="quarter" idx="11"/>
+          </p:nvPr>
+        </p:nvSpPr>
+        <p:spPr/>
+        <p:txBody>
+          <a:bodyPr/>
+          <a:lstStyle/>
+          <a:p>
+            <a:r>
+              <a:rPr lang="en-US" smtClean="0"/>
+              <a:t>Footer: &gt;Insert &gt;Header &amp; Footer</a:t>
+            </a:r>
+            <a:endParaRPr lang="en-US" dirty="0" smtClean="0"/>
+          </a:p>
+        </p:txBody>
+      </p:sp>
+      <p:sp>
+        <p:nvSpPr>
+          <p:cNvPr id="6" name="Slide Number Placeholder 5"/>
+          <p:cNvSpPr>
+            <a:spLocks noGrp="1"/>
+          </p:cNvSpPr>
+          <p:nvPr>
+            <p:ph type="sldNum" sz="quarter" idx="12"/>
+          </p:nvPr>
+        </p:nvSpPr>
+        <p:spPr/>
+        <p:txBody>
+          <a:bodyPr/>
+          <a:lstStyle/>
+          <a:p>
+            <a:fld id="{57CB76AC-E5DF-427C-ABDC-2F4FBD8E4B69}" type="slidenum">
+              <a:rPr lang="en-US" smtClean="0"/>
+              <a:t>7</a:t>
+            </a:fld>
+            <a:endParaRPr lang="en-US" dirty="0"/>
+          </a:p>
+        </p:txBody>
+      </p:sp>
+      <p:pic>
+        <p:nvPicPr>
+          <p:cNvPr id="1026" name="Picture 2" descr="http://www.rohde-schwarz.fr/live/rs/mediadb/pspic/image/14/ZVA67start4e4d240e73562.jpg"/>
+          <p:cNvPicPr>
+            <a:picLocks noChangeAspect="1" noChangeArrowheads="1"/>
+          </p:cNvPicPr>
+          <p:nvPr/>
+        </p:nvPicPr>
+        <p:blipFill>
+          <a:blip r:embed="rId2">
+            <a:extLst>
+              <a:ext uri="{28A0092B-C50C-407E-A947-70E740481C1C}">
+                <a14:useLocalDpi xmlns:a14="http://schemas.microsoft.com/office/drawing/2010/main" val="0"/>
+              </a:ext>
+            </a:extLst>
+          </a:blip>
+          <a:srcRect/>
+          <a:stretch>
+            <a:fillRect/>
+          </a:stretch>
+        </p:blipFill>
+        <p:spPr bwMode="auto">
+          <a:xfrm>
+            <a:off x="6285975" y="1841710"/>
+            <a:ext cx="1259472" cy="838200"/>
+          </a:xfrm>
+          <a:prstGeom prst="rect">
+            <a:avLst/>
+          </a:prstGeom>
+          <a:noFill/>
+          <a:extLst>
+            <a:ext uri="{909E8E84-426E-40DD-AFC4-6F175D3DCCD1}">
+              <a14:hiddenFill xmlns:a14="http://schemas.microsoft.com/office/drawing/2010/main">
+                <a:solidFill>
+                  <a:srgbClr val="FFFFFF"/>
+                </a:solidFill>
+              </a14:hiddenFill>
+            </a:ext>
+          </a:extLst>
+        </p:spPr>
+      </p:pic>
+      <p:pic>
+        <p:nvPicPr>
+          <p:cNvPr id="11" name="Picture 10"/>
+          <p:cNvPicPr>
+            <a:picLocks noChangeAspect="1"/>
+          </p:cNvPicPr>
+          <p:nvPr/>
+        </p:nvPicPr>
+        <p:blipFill rotWithShape="1">
+          <a:blip r:embed="rId3">
+            <a:extLst>
+              <a:ext uri="{28A0092B-C50C-407E-A947-70E740481C1C}">
+                <a14:useLocalDpi xmlns:a14="http://schemas.microsoft.com/office/drawing/2010/main" val="0"/>
+              </a:ext>
+            </a:extLst>
+          </a:blip>
+          <a:srcRect b="15612"/>
+          <a:stretch/>
+        </p:blipFill>
+        <p:spPr>
+          <a:xfrm>
+            <a:off x="7086600" y="3123738"/>
+            <a:ext cx="1296435" cy="2471400"/>
+          </a:xfrm>
+          <a:prstGeom prst="rect">
+            <a:avLst/>
+          </a:prstGeom>
+        </p:spPr>
+      </p:pic>
+      <p:pic>
+        <p:nvPicPr>
+          <p:cNvPr id="12" name="Picture 11"/>
+          <p:cNvPicPr>
+            <a:picLocks noChangeAspect="1"/>
+          </p:cNvPicPr>
+          <p:nvPr/>
+        </p:nvPicPr>
+        <p:blipFill>
+          <a:blip r:embed="rId4">
+            <a:extLst>
+              <a:ext uri="{28A0092B-C50C-407E-A947-70E740481C1C}">
+                <a14:useLocalDpi xmlns:a14="http://schemas.microsoft.com/office/drawing/2010/main" val="0"/>
+              </a:ext>
+            </a:extLst>
+          </a:blip>
+          <a:stretch>
+            <a:fillRect/>
+          </a:stretch>
+        </p:blipFill>
+        <p:spPr>
+          <a:xfrm>
+            <a:off x="1065919" y="1850744"/>
+            <a:ext cx="4708161" cy="820132"/>
+          </a:xfrm>
+          <a:prstGeom prst="rect">
+            <a:avLst/>
+          </a:prstGeom>
+        </p:spPr>
+      </p:pic>
+      <p:cxnSp>
+        <p:nvCxnSpPr>
+          <p:cNvPr id="9" name="Straight Arrow Connector 8"/>
+          <p:cNvCxnSpPr/>
+          <p:nvPr/>
+        </p:nvCxnSpPr>
+        <p:spPr>
+          <a:xfrm>
+            <a:off x="5730781" y="2146690"/>
+            <a:ext cx="457200" cy="0"/>
+          </a:xfrm>
+          <a:prstGeom prst="straightConnector1">
+            <a:avLst/>
+          </a:prstGeom>
+          <a:ln w="38100">
+            <a:tailEnd type="triangle"/>
+          </a:ln>
+        </p:spPr>
+        <p:style>
+          <a:lnRef idx="1">
+            <a:schemeClr val="accent1"/>
+          </a:lnRef>
+          <a:fillRef idx="0">
+            <a:schemeClr val="accent1"/>
+          </a:fillRef>
+          <a:effectRef idx="0">
+            <a:schemeClr val="accent1"/>
+          </a:effectRef>
+          <a:fontRef idx="minor">
+            <a:schemeClr val="tx1"/>
+          </a:fontRef>
+        </p:style>
+      </p:cxnSp>
+      <p:cxnSp>
+        <p:nvCxnSpPr>
+          <p:cNvPr id="14" name="Straight Arrow Connector 13"/>
+          <p:cNvCxnSpPr/>
+          <p:nvPr/>
+        </p:nvCxnSpPr>
+        <p:spPr>
+          <a:xfrm flipV="1">
+            <a:off x="8081875" y="3962400"/>
+            <a:ext cx="0" cy="228600"/>
+          </a:xfrm>
+          <a:prstGeom prst="straightConnector1">
+            <a:avLst/>
+          </a:prstGeom>
+          <a:ln w="38100">
+            <a:tailEnd type="triangle"/>
+          </a:ln>
+        </p:spPr>
+        <p:style>
+          <a:lnRef idx="1">
+            <a:schemeClr val="accent1"/>
+          </a:lnRef>
+          <a:fillRef idx="0">
+            <a:schemeClr val="accent1"/>
+          </a:fillRef>
+          <a:effectRef idx="0">
+            <a:schemeClr val="accent1"/>
+          </a:effectRef>
+          <a:fontRef idx="minor">
+            <a:schemeClr val="tx1"/>
+          </a:fontRef>
+        </p:style>
+      </p:cxnSp>
+      <p:cxnSp>
+        <p:nvCxnSpPr>
+          <p:cNvPr id="17" name="Straight Arrow Connector 16"/>
+          <p:cNvCxnSpPr/>
+          <p:nvPr/>
+        </p:nvCxnSpPr>
+        <p:spPr>
+          <a:xfrm flipH="1" flipV="1">
+            <a:off x="7772400" y="5410200"/>
+            <a:ext cx="152400" cy="152400"/>
+          </a:xfrm>
+          <a:prstGeom prst="straightConnector1">
+            <a:avLst/>
+          </a:prstGeom>
+          <a:ln w="38100">
+            <a:tailEnd type="triangle"/>
+          </a:ln>
+        </p:spPr>
+        <p:style>
+          <a:lnRef idx="1">
+            <a:schemeClr val="accent1"/>
+          </a:lnRef>
+          <a:fillRef idx="0">
+            <a:schemeClr val="accent1"/>
+          </a:fillRef>
+          <a:effectRef idx="0">
+            <a:schemeClr val="accent1"/>
+          </a:effectRef>
+          <a:fontRef idx="minor">
+            <a:schemeClr val="tx1"/>
+          </a:fontRef>
+        </p:style>
+      </p:cxnSp>
+    </p:spTree>
+    <p:extLst>
+      <p:ext uri="{BB962C8B-B14F-4D97-AF65-F5344CB8AC3E}">
+        <p14:creationId xmlns:p14="http://schemas.microsoft.com/office/powerpoint/2010/main" val="1548359802"/>
+      </p:ext>
+    </p:extLst>
+  </p:cSld>
+  <p:clrMapOvr>
+    <a:masterClrMapping/>
+  </p:clrMapOvr>
+</p:sld>
+</file>
+
+<file path=ppt/slides/slide8.xml><?xml version="1.0" encoding="utf-8"?>
+<p:sld xmlns:a="http://schemas.openxmlformats.org/drawingml/2006/main" xmlns:r="http://schemas.openxmlformats.org/officeDocument/2006/relationships" xmlns:p="http://schemas.openxmlformats.org/presentationml/2006/main">
+  <p:cSld>
+    <p:spTree>
+      <p:nvGrpSpPr>
+        <p:cNvPr id="1" name=""/>
+        <p:cNvGrpSpPr/>
+        <p:nvPr/>
+      </p:nvGrpSpPr>
+      <p:grpSpPr>
+        <a:xfrm>
+          <a:off x="0" y="0"/>
+          <a:ext cx="0" cy="0"/>
+          <a:chOff x="0" y="0"/>
+          <a:chExt cx="0" cy="0"/>
+        </a:xfrm>
+      </p:grpSpPr>
+      <p:sp>
+        <p:nvSpPr>
+          <p:cNvPr id="2" name="Title 1"/>
+          <p:cNvSpPr>
+            <a:spLocks noGrp="1"/>
+          </p:cNvSpPr>
+          <p:nvPr>
+            <p:ph type="title"/>
+          </p:nvPr>
+        </p:nvSpPr>
+        <p:spPr>
+          <a:xfrm>
+            <a:off x="360000" y="216000"/>
+            <a:ext cx="8280000" cy="721307"/>
+          </a:xfrm>
+        </p:spPr>
+        <p:txBody>
+          <a:bodyPr/>
+          <a:lstStyle/>
+          <a:p>
+            <a:r>
+              <a:rPr lang="en-US" dirty="0" smtClean="0"/>
+              <a:t>PA Compression Test</a:t>
+            </a:r>
+            <a:endParaRPr lang="en-US" dirty="0"/>
+          </a:p>
+        </p:txBody>
+      </p:sp>
+      <p:sp>
+        <p:nvSpPr>
+          <p:cNvPr id="3" name="Content Placeholder 2"/>
+          <p:cNvSpPr>
+            <a:spLocks noGrp="1"/>
+          </p:cNvSpPr>
+          <p:nvPr>
+            <p:ph idx="1"/>
+          </p:nvPr>
+        </p:nvSpPr>
+        <p:spPr>
+          <a:xfrm>
+            <a:off x="360000" y="937307"/>
+            <a:ext cx="8280000" cy="5110694"/>
+          </a:xfrm>
+        </p:spPr>
+        <p:txBody>
+          <a:bodyPr/>
+          <a:lstStyle/>
+          <a:p>
+            <a:pPr marL="342900" indent="-342900">
+              <a:buFont typeface="+mj-lt"/>
+              <a:buAutoNum type="arabicPeriod" startAt="3"/>
+            </a:pPr>
+            <a:r>
+              <a:rPr lang="en-US" dirty="0" smtClean="0"/>
+              <a:t>All traces data -&gt; memory (hold)</a:t>
+            </a:r>
+          </a:p>
+          <a:p>
+            <a:pPr lvl="1"/>
+            <a:r>
+              <a:rPr lang="en-US" dirty="0" smtClean="0"/>
+              <a:t>Functionality already built into ZVA:</a:t>
+            </a:r>
+            <a:endParaRPr lang="en-US" dirty="0" smtClean="0"/>
+          </a:p>
+          <a:p>
+            <a:pPr lvl="1"/>
+            <a:endParaRPr lang="en-US" dirty="0" smtClean="0"/>
+          </a:p>
+          <a:p>
+            <a:pPr lvl="1"/>
+            <a:endParaRPr lang="en-US" dirty="0" smtClean="0"/>
+          </a:p>
+          <a:p>
+            <a:pPr lvl="1"/>
+            <a:endParaRPr lang="en-US" dirty="0"/>
+          </a:p>
+        </p:txBody>
+      </p:sp>
+      <p:sp>
+        <p:nvSpPr>
+          <p:cNvPr id="4" name="Date Placeholder 3"/>
+          <p:cNvSpPr>
+            <a:spLocks noGrp="1"/>
+          </p:cNvSpPr>
+          <p:nvPr>
+            <p:ph type="dt" sz="half" idx="10"/>
+          </p:nvPr>
+        </p:nvSpPr>
+        <p:spPr/>
+        <p:txBody>
+          <a:bodyPr/>
+          <a:lstStyle/>
+          <a:p>
+            <a:fld id="{FB1601E7-E2BE-4CD1-8EDF-048B8A04B4E7}" type="datetime1">
+              <a:rPr lang="de-DE" smtClean="0"/>
+              <a:t>24.09.2015</a:t>
+            </a:fld>
+            <a:endParaRPr lang="en-US" dirty="0" smtClean="0"/>
+          </a:p>
+        </p:txBody>
+      </p:sp>
+      <p:sp>
+        <p:nvSpPr>
+          <p:cNvPr id="5" name="Footer Placeholder 4"/>
+          <p:cNvSpPr>
+            <a:spLocks noGrp="1"/>
+          </p:cNvSpPr>
+          <p:nvPr>
+            <p:ph type="ftr" sz="quarter" idx="11"/>
+          </p:nvPr>
+        </p:nvSpPr>
+        <p:spPr/>
+        <p:txBody>
+          <a:bodyPr/>
+          <a:lstStyle/>
+          <a:p>
+            <a:r>
+              <a:rPr lang="en-US" smtClean="0"/>
+              <a:t>Footer: &gt;Insert &gt;Header &amp; Footer</a:t>
+            </a:r>
+            <a:endParaRPr lang="en-US" dirty="0" smtClean="0"/>
+          </a:p>
+        </p:txBody>
+      </p:sp>
+      <p:sp>
+        <p:nvSpPr>
+          <p:cNvPr id="6" name="Slide Number Placeholder 5"/>
+          <p:cNvSpPr>
+            <a:spLocks noGrp="1"/>
+          </p:cNvSpPr>
+          <p:nvPr>
+            <p:ph type="sldNum" sz="quarter" idx="12"/>
+          </p:nvPr>
+        </p:nvSpPr>
+        <p:spPr/>
+        <p:txBody>
+          <a:bodyPr/>
+          <a:lstStyle/>
+          <a:p>
+            <a:fld id="{57CB76AC-E5DF-427C-ABDC-2F4FBD8E4B69}" type="slidenum">
+              <a:rPr lang="en-US" smtClean="0"/>
+              <a:t>8</a:t>
+            </a:fld>
+            <a:endParaRPr lang="en-US" dirty="0"/>
+          </a:p>
+        </p:txBody>
+      </p:sp>
+      <p:pic>
+        <p:nvPicPr>
+          <p:cNvPr id="7" name="Picture 6"/>
           <p:cNvPicPr>
             <a:picLocks noChangeAspect="1"/>
           </p:cNvPicPr>
@@ -7254,8 +8111,589 @@
         </p:blipFill>
         <p:spPr>
           <a:xfrm>
-            <a:off x="1906994" y="1828800"/>
-            <a:ext cx="5906012" cy="1028789"/>
+            <a:off x="3707675" y="1981200"/>
+            <a:ext cx="1584649" cy="3623964"/>
+          </a:xfrm>
+          <a:prstGeom prst="rect">
+            <a:avLst/>
+          </a:prstGeom>
+        </p:spPr>
+      </p:pic>
+      <p:cxnSp>
+        <p:nvCxnSpPr>
+          <p:cNvPr id="10" name="Straight Arrow Connector 9"/>
+          <p:cNvCxnSpPr/>
+          <p:nvPr/>
+        </p:nvCxnSpPr>
+        <p:spPr>
+          <a:xfrm flipV="1">
+            <a:off x="3581400" y="3124200"/>
+            <a:ext cx="211475" cy="237336"/>
+          </a:xfrm>
+          <a:prstGeom prst="straightConnector1">
+            <a:avLst/>
+          </a:prstGeom>
+          <a:ln w="38100">
+            <a:tailEnd type="triangle"/>
+          </a:ln>
+        </p:spPr>
+        <p:style>
+          <a:lnRef idx="1">
+            <a:schemeClr val="accent1"/>
+          </a:lnRef>
+          <a:fillRef idx="0">
+            <a:schemeClr val="accent1"/>
+          </a:fillRef>
+          <a:effectRef idx="0">
+            <a:schemeClr val="accent1"/>
+          </a:effectRef>
+          <a:fontRef idx="minor">
+            <a:schemeClr val="tx1"/>
+          </a:fontRef>
+        </p:style>
+      </p:cxnSp>
+      <p:cxnSp>
+        <p:nvCxnSpPr>
+          <p:cNvPr id="16" name="Straight Arrow Connector 15"/>
+          <p:cNvCxnSpPr/>
+          <p:nvPr/>
+        </p:nvCxnSpPr>
+        <p:spPr>
+          <a:xfrm flipH="1">
+            <a:off x="5292324" y="2819400"/>
+            <a:ext cx="270276" cy="0"/>
+          </a:xfrm>
+          <a:prstGeom prst="straightConnector1">
+            <a:avLst/>
+          </a:prstGeom>
+          <a:ln w="38100">
+            <a:tailEnd type="triangle"/>
+          </a:ln>
+        </p:spPr>
+        <p:style>
+          <a:lnRef idx="1">
+            <a:schemeClr val="accent1"/>
+          </a:lnRef>
+          <a:fillRef idx="0">
+            <a:schemeClr val="accent1"/>
+          </a:fillRef>
+          <a:effectRef idx="0">
+            <a:schemeClr val="accent1"/>
+          </a:effectRef>
+          <a:fontRef idx="minor">
+            <a:schemeClr val="tx1"/>
+          </a:fontRef>
+        </p:style>
+      </p:cxnSp>
+    </p:spTree>
+    <p:extLst>
+      <p:ext uri="{BB962C8B-B14F-4D97-AF65-F5344CB8AC3E}">
+        <p14:creationId xmlns:p14="http://schemas.microsoft.com/office/powerpoint/2010/main" val="393410090"/>
+      </p:ext>
+    </p:extLst>
+  </p:cSld>
+  <p:clrMapOvr>
+    <a:masterClrMapping/>
+  </p:clrMapOvr>
+</p:sld>
+</file>
+
+<file path=ppt/slides/slide9.xml><?xml version="1.0" encoding="utf-8"?>
+<p:sld xmlns:a="http://schemas.openxmlformats.org/drawingml/2006/main" xmlns:r="http://schemas.openxmlformats.org/officeDocument/2006/relationships" xmlns:p="http://schemas.openxmlformats.org/presentationml/2006/main">
+  <p:cSld>
+    <p:spTree>
+      <p:nvGrpSpPr>
+        <p:cNvPr id="1" name=""/>
+        <p:cNvGrpSpPr/>
+        <p:nvPr/>
+      </p:nvGrpSpPr>
+      <p:grpSpPr>
+        <a:xfrm>
+          <a:off x="0" y="0"/>
+          <a:ext cx="0" cy="0"/>
+          <a:chOff x="0" y="0"/>
+          <a:chExt cx="0" cy="0"/>
+        </a:xfrm>
+      </p:grpSpPr>
+      <p:sp>
+        <p:nvSpPr>
+          <p:cNvPr id="2" name="Title 1"/>
+          <p:cNvSpPr>
+            <a:spLocks noGrp="1"/>
+          </p:cNvSpPr>
+          <p:nvPr>
+            <p:ph type="title"/>
+          </p:nvPr>
+        </p:nvSpPr>
+        <p:spPr>
+          <a:xfrm>
+            <a:off x="360000" y="216000"/>
+            <a:ext cx="8280000" cy="721307"/>
+          </a:xfrm>
+        </p:spPr>
+        <p:txBody>
+          <a:bodyPr/>
+          <a:lstStyle/>
+          <a:p>
+            <a:r>
+              <a:rPr lang="en-US" dirty="0" smtClean="0"/>
+              <a:t>PA Compression Test</a:t>
+            </a:r>
+            <a:endParaRPr lang="en-US" dirty="0"/>
+          </a:p>
+        </p:txBody>
+      </p:sp>
+      <p:sp>
+        <p:nvSpPr>
+          <p:cNvPr id="3" name="Content Placeholder 2"/>
+          <p:cNvSpPr>
+            <a:spLocks noGrp="1"/>
+          </p:cNvSpPr>
+          <p:nvPr>
+            <p:ph idx="1"/>
+          </p:nvPr>
+        </p:nvSpPr>
+        <p:spPr>
+          <a:xfrm>
+            <a:off x="360000" y="937307"/>
+            <a:ext cx="8280000" cy="5110694"/>
+          </a:xfrm>
+        </p:spPr>
+        <p:txBody>
+          <a:bodyPr/>
+          <a:lstStyle/>
+          <a:p>
+            <a:r>
+              <a:rPr lang="en-US" dirty="0" smtClean="0"/>
+              <a:t>Overall workflow</a:t>
+            </a:r>
+            <a:endParaRPr lang="en-US" dirty="0" smtClean="0"/>
+          </a:p>
+          <a:p>
+            <a:pPr lvl="1"/>
+            <a:endParaRPr lang="en-US" dirty="0" smtClean="0"/>
+          </a:p>
+          <a:p>
+            <a:pPr lvl="1"/>
+            <a:endParaRPr lang="en-US" dirty="0" smtClean="0"/>
+          </a:p>
+          <a:p>
+            <a:pPr lvl="1"/>
+            <a:endParaRPr lang="en-US" dirty="0"/>
+          </a:p>
+        </p:txBody>
+      </p:sp>
+      <p:sp>
+        <p:nvSpPr>
+          <p:cNvPr id="4" name="Date Placeholder 3"/>
+          <p:cNvSpPr>
+            <a:spLocks noGrp="1"/>
+          </p:cNvSpPr>
+          <p:nvPr>
+            <p:ph type="dt" sz="half" idx="10"/>
+          </p:nvPr>
+        </p:nvSpPr>
+        <p:spPr/>
+        <p:txBody>
+          <a:bodyPr/>
+          <a:lstStyle/>
+          <a:p>
+            <a:fld id="{FB1601E7-E2BE-4CD1-8EDF-048B8A04B4E7}" type="datetime1">
+              <a:rPr lang="de-DE" smtClean="0"/>
+              <a:t>24.09.2015</a:t>
+            </a:fld>
+            <a:endParaRPr lang="en-US" dirty="0" smtClean="0"/>
+          </a:p>
+        </p:txBody>
+      </p:sp>
+      <p:sp>
+        <p:nvSpPr>
+          <p:cNvPr id="5" name="Footer Placeholder 4"/>
+          <p:cNvSpPr>
+            <a:spLocks noGrp="1"/>
+          </p:cNvSpPr>
+          <p:nvPr>
+            <p:ph type="ftr" sz="quarter" idx="11"/>
+          </p:nvPr>
+        </p:nvSpPr>
+        <p:spPr/>
+        <p:txBody>
+          <a:bodyPr/>
+          <a:lstStyle/>
+          <a:p>
+            <a:r>
+              <a:rPr lang="en-US" smtClean="0"/>
+              <a:t>Footer: &gt;Insert &gt;Header &amp; Footer</a:t>
+            </a:r>
+            <a:endParaRPr lang="en-US" dirty="0" smtClean="0"/>
+          </a:p>
+        </p:txBody>
+      </p:sp>
+      <p:sp>
+        <p:nvSpPr>
+          <p:cNvPr id="6" name="Slide Number Placeholder 5"/>
+          <p:cNvSpPr>
+            <a:spLocks noGrp="1"/>
+          </p:cNvSpPr>
+          <p:nvPr>
+            <p:ph type="sldNum" sz="quarter" idx="12"/>
+          </p:nvPr>
+        </p:nvSpPr>
+        <p:spPr/>
+        <p:txBody>
+          <a:bodyPr/>
+          <a:lstStyle/>
+          <a:p>
+            <a:fld id="{57CB76AC-E5DF-427C-ABDC-2F4FBD8E4B69}" type="slidenum">
+              <a:rPr lang="en-US" smtClean="0"/>
+              <a:t>9</a:t>
+            </a:fld>
+            <a:endParaRPr lang="en-US" dirty="0"/>
+          </a:p>
+        </p:txBody>
+      </p:sp>
+      <p:pic>
+        <p:nvPicPr>
+          <p:cNvPr id="7" name="Picture 6"/>
+          <p:cNvPicPr>
+            <a:picLocks noChangeAspect="1"/>
+          </p:cNvPicPr>
+          <p:nvPr/>
+        </p:nvPicPr>
+        <p:blipFill>
+          <a:blip r:embed="rId2">
+            <a:extLst>
+              <a:ext uri="{28A0092B-C50C-407E-A947-70E740481C1C}">
+                <a14:useLocalDpi xmlns:a14="http://schemas.microsoft.com/office/drawing/2010/main" val="0"/>
+              </a:ext>
+            </a:extLst>
+          </a:blip>
+          <a:stretch>
+            <a:fillRect/>
+          </a:stretch>
+        </p:blipFill>
+        <p:spPr>
+          <a:xfrm>
+            <a:off x="4882151" y="3352800"/>
+            <a:ext cx="1045419" cy="2390789"/>
+          </a:xfrm>
+          <a:prstGeom prst="rect">
+            <a:avLst/>
+          </a:prstGeom>
+        </p:spPr>
+      </p:pic>
+      <p:pic>
+        <p:nvPicPr>
+          <p:cNvPr id="11" name="Picture 10"/>
+          <p:cNvPicPr>
+            <a:picLocks noChangeAspect="1"/>
+          </p:cNvPicPr>
+          <p:nvPr/>
+        </p:nvPicPr>
+        <p:blipFill rotWithShape="1">
+          <a:blip r:embed="rId3">
+            <a:extLst>
+              <a:ext uri="{28A0092B-C50C-407E-A947-70E740481C1C}">
+                <a14:useLocalDpi xmlns:a14="http://schemas.microsoft.com/office/drawing/2010/main" val="0"/>
+              </a:ext>
+            </a:extLst>
+          </a:blip>
+          <a:srcRect l="35266" b="15612"/>
+          <a:stretch/>
+        </p:blipFill>
+        <p:spPr>
+          <a:xfrm>
+            <a:off x="465729" y="1508095"/>
+            <a:ext cx="839235" cy="2471400"/>
+          </a:xfrm>
+          <a:prstGeom prst="rect">
+            <a:avLst/>
+          </a:prstGeom>
+        </p:spPr>
+      </p:pic>
+      <p:pic>
+        <p:nvPicPr>
+          <p:cNvPr id="12" name="Picture 11"/>
+          <p:cNvPicPr>
+            <a:picLocks noChangeAspect="1"/>
+          </p:cNvPicPr>
+          <p:nvPr/>
+        </p:nvPicPr>
+        <p:blipFill>
+          <a:blip r:embed="rId4" cstate="print">
+            <a:extLst>
+              <a:ext uri="{28A0092B-C50C-407E-A947-70E740481C1C}">
+                <a14:useLocalDpi xmlns:a14="http://schemas.microsoft.com/office/drawing/2010/main" val="0"/>
+              </a:ext>
+            </a:extLst>
+          </a:blip>
+          <a:stretch>
+            <a:fillRect/>
+          </a:stretch>
+        </p:blipFill>
+        <p:spPr>
+          <a:xfrm>
+            <a:off x="1630695" y="1812895"/>
+            <a:ext cx="2209800" cy="1481990"/>
+          </a:xfrm>
+          <a:prstGeom prst="rect">
+            <a:avLst/>
+          </a:prstGeom>
+        </p:spPr>
+      </p:pic>
+      <p:cxnSp>
+        <p:nvCxnSpPr>
+          <p:cNvPr id="9" name="Straight Arrow Connector 8"/>
+          <p:cNvCxnSpPr/>
+          <p:nvPr/>
+        </p:nvCxnSpPr>
+        <p:spPr>
+          <a:xfrm>
+            <a:off x="1304964" y="1965295"/>
+            <a:ext cx="287865" cy="0"/>
+          </a:xfrm>
+          <a:prstGeom prst="straightConnector1">
+            <a:avLst/>
+          </a:prstGeom>
+          <a:ln w="38100">
+            <a:tailEnd type="triangle"/>
+          </a:ln>
+        </p:spPr>
+        <p:style>
+          <a:lnRef idx="1">
+            <a:schemeClr val="accent1"/>
+          </a:lnRef>
+          <a:fillRef idx="0">
+            <a:schemeClr val="accent1"/>
+          </a:fillRef>
+          <a:effectRef idx="0">
+            <a:schemeClr val="accent1"/>
+          </a:effectRef>
+          <a:fontRef idx="minor">
+            <a:schemeClr val="tx1"/>
+          </a:fontRef>
+        </p:style>
+      </p:cxnSp>
+      <p:pic>
+        <p:nvPicPr>
+          <p:cNvPr id="14" name="Picture 13"/>
+          <p:cNvPicPr>
+            <a:picLocks noChangeAspect="1"/>
+          </p:cNvPicPr>
+          <p:nvPr/>
+        </p:nvPicPr>
+        <p:blipFill rotWithShape="1">
+          <a:blip r:embed="rId3">
+            <a:extLst>
+              <a:ext uri="{28A0092B-C50C-407E-A947-70E740481C1C}">
+                <a14:useLocalDpi xmlns:a14="http://schemas.microsoft.com/office/drawing/2010/main" val="0"/>
+              </a:ext>
+            </a:extLst>
+          </a:blip>
+          <a:srcRect l="35266" b="15612"/>
+          <a:stretch/>
+        </p:blipFill>
+        <p:spPr>
+          <a:xfrm>
+            <a:off x="4882151" y="651104"/>
+            <a:ext cx="839811" cy="2473096"/>
+          </a:xfrm>
+          <a:prstGeom prst="rect">
+            <a:avLst/>
+          </a:prstGeom>
+        </p:spPr>
+      </p:pic>
+      <p:cxnSp>
+        <p:nvCxnSpPr>
+          <p:cNvPr id="15" name="Straight Arrow Connector 14"/>
+          <p:cNvCxnSpPr/>
+          <p:nvPr/>
+        </p:nvCxnSpPr>
+        <p:spPr>
+          <a:xfrm flipV="1">
+            <a:off x="5418820" y="1450609"/>
+            <a:ext cx="0" cy="228600"/>
+          </a:xfrm>
+          <a:prstGeom prst="straightConnector1">
+            <a:avLst/>
+          </a:prstGeom>
+          <a:ln w="38100">
+            <a:tailEnd type="triangle"/>
+          </a:ln>
+        </p:spPr>
+        <p:style>
+          <a:lnRef idx="1">
+            <a:schemeClr val="accent1"/>
+          </a:lnRef>
+          <a:fillRef idx="0">
+            <a:schemeClr val="accent1"/>
+          </a:fillRef>
+          <a:effectRef idx="0">
+            <a:schemeClr val="accent1"/>
+          </a:effectRef>
+          <a:fontRef idx="minor">
+            <a:schemeClr val="tx1"/>
+          </a:fontRef>
+        </p:style>
+      </p:cxnSp>
+      <p:sp>
+        <p:nvSpPr>
+          <p:cNvPr id="18" name="Plus 17"/>
+          <p:cNvSpPr/>
+          <p:nvPr/>
+        </p:nvSpPr>
+        <p:spPr>
+          <a:xfrm>
+            <a:off x="4267200" y="1695709"/>
+            <a:ext cx="381000" cy="381000"/>
+          </a:xfrm>
+          <a:prstGeom prst="mathPlus">
+            <a:avLst/>
+          </a:prstGeom>
+          <a:ln>
+            <a:noFill/>
+          </a:ln>
+        </p:spPr>
+        <p:style>
+          <a:lnRef idx="2">
+            <a:schemeClr val="accent1">
+              <a:shade val="50000"/>
+            </a:schemeClr>
+          </a:lnRef>
+          <a:fillRef idx="1">
+            <a:schemeClr val="accent1"/>
+          </a:fillRef>
+          <a:effectRef idx="0">
+            <a:schemeClr val="accent1"/>
+          </a:effectRef>
+          <a:fontRef idx="minor">
+            <a:schemeClr val="lt1"/>
+          </a:fontRef>
+        </p:style>
+        <p:txBody>
+          <a:bodyPr rot="0" spcFirstLastPara="0" vertOverflow="overflow" horzOverflow="overflow" vert="horz" wrap="square" lIns="0" tIns="0" rIns="0" bIns="0" numCol="1" spcCol="0" rtlCol="0" fromWordArt="0" anchor="t" anchorCtr="0" forceAA="0" compatLnSpc="1">
+            <a:prstTxWarp prst="textNoShape">
+              <a:avLst/>
+            </a:prstTxWarp>
+            <a:noAutofit/>
+          </a:bodyPr>
+          <a:lstStyle/>
+          <a:p>
+            <a:pPr algn="ctr"/>
+            <a:endParaRPr lang="en-US" sz="2400" dirty="0" err="1"/>
+          </a:p>
+        </p:txBody>
+      </p:sp>
+      <p:sp>
+        <p:nvSpPr>
+          <p:cNvPr id="19" name="Plus 18"/>
+          <p:cNvSpPr/>
+          <p:nvPr/>
+        </p:nvSpPr>
+        <p:spPr>
+          <a:xfrm>
+            <a:off x="4267200" y="4356300"/>
+            <a:ext cx="381000" cy="381000"/>
+          </a:xfrm>
+          <a:prstGeom prst="mathPlus">
+            <a:avLst/>
+          </a:prstGeom>
+          <a:ln>
+            <a:noFill/>
+          </a:ln>
+        </p:spPr>
+        <p:style>
+          <a:lnRef idx="2">
+            <a:schemeClr val="accent1">
+              <a:shade val="50000"/>
+            </a:schemeClr>
+          </a:lnRef>
+          <a:fillRef idx="1">
+            <a:schemeClr val="accent1"/>
+          </a:fillRef>
+          <a:effectRef idx="0">
+            <a:schemeClr val="accent1"/>
+          </a:effectRef>
+          <a:fontRef idx="minor">
+            <a:schemeClr val="lt1"/>
+          </a:fontRef>
+        </p:style>
+        <p:txBody>
+          <a:bodyPr rot="0" spcFirstLastPara="0" vertOverflow="overflow" horzOverflow="overflow" vert="horz" wrap="square" lIns="0" tIns="0" rIns="0" bIns="0" numCol="1" spcCol="0" rtlCol="0" fromWordArt="0" anchor="t" anchorCtr="0" forceAA="0" compatLnSpc="1">
+            <a:prstTxWarp prst="textNoShape">
+              <a:avLst/>
+            </a:prstTxWarp>
+            <a:noAutofit/>
+          </a:bodyPr>
+          <a:lstStyle/>
+          <a:p>
+            <a:pPr algn="ctr"/>
+            <a:endParaRPr lang="en-US" sz="2400" dirty="0" err="1"/>
+          </a:p>
+        </p:txBody>
+      </p:sp>
+      <p:sp>
+        <p:nvSpPr>
+          <p:cNvPr id="20" name="TextBox 19"/>
+          <p:cNvSpPr txBox="1"/>
+          <p:nvPr/>
+        </p:nvSpPr>
+        <p:spPr>
+          <a:xfrm>
+            <a:off x="7006197" y="1143000"/>
+            <a:ext cx="609913" cy="369332"/>
+          </a:xfrm>
+          <a:prstGeom prst="rect">
+            <a:avLst/>
+          </a:prstGeom>
+          <a:noFill/>
+        </p:spPr>
+        <p:txBody>
+          <a:bodyPr wrap="square" rtlCol="0">
+            <a:spAutoFit/>
+          </a:bodyPr>
+          <a:lstStyle/>
+          <a:p>
+            <a:r>
+              <a:rPr lang="en-US" dirty="0" smtClean="0">
+                <a:solidFill>
+                  <a:schemeClr val="accent1"/>
+                </a:solidFill>
+              </a:rPr>
+              <a:t>OR</a:t>
+            </a:r>
+            <a:endParaRPr lang="en-US" dirty="0">
+              <a:solidFill>
+                <a:schemeClr val="accent1"/>
+              </a:solidFill>
+            </a:endParaRPr>
+          </a:p>
+        </p:txBody>
+      </p:sp>
+      <p:pic>
+        <p:nvPicPr>
+          <p:cNvPr id="21" name="Picture 20"/>
+          <p:cNvPicPr>
+            <a:picLocks noChangeAspect="1"/>
+          </p:cNvPicPr>
+          <p:nvPr/>
+        </p:nvPicPr>
+        <p:blipFill>
+          <a:blip r:embed="rId5">
+            <a:extLst>
+              <a:ext uri="{28A0092B-C50C-407E-A947-70E740481C1C}">
+                <a14:useLocalDpi xmlns:a14="http://schemas.microsoft.com/office/drawing/2010/main" val="0"/>
+              </a:ext>
+            </a:extLst>
+          </a:blip>
+          <a:stretch>
+            <a:fillRect/>
+          </a:stretch>
+        </p:blipFill>
+        <p:spPr>
+          <a:xfrm>
+            <a:off x="5827115" y="1690780"/>
+            <a:ext cx="2968080" cy="517020"/>
           </a:xfrm>
           <a:prstGeom prst="rect">
             <a:avLst/>
@@ -7265,7 +8703,7 @@
     </p:spTree>
     <p:extLst>
       <p:ext uri="{BB962C8B-B14F-4D97-AF65-F5344CB8AC3E}">
-        <p14:creationId xmlns:p14="http://schemas.microsoft.com/office/powerpoint/2010/main" val="1548359802"/>
+        <p14:creationId xmlns:p14="http://schemas.microsoft.com/office/powerpoint/2010/main" val="2152436505"/>
       </p:ext>
     </p:extLst>
   </p:cSld>

</xml_diff>